<commit_message>
Update Symfony slides (doctrine, form, route, twig...)
</commit_message>
<xml_diff>
--- a/slides/symfony2-basics-conserto/img/schema.pptx
+++ b/slides/symfony2-basics-conserto/img/schema.pptx
@@ -9,6 +9,7 @@
     <p:sldId id="257" r:id="rId3"/>
     <p:sldId id="258" r:id="rId4"/>
     <p:sldId id="259" r:id="rId5"/>
+    <p:sldId id="260" r:id="rId6"/>
   </p:sldIdLst>
   <p:sldSz cx="12192000" cy="6858000"/>
   <p:notesSz cx="6858000" cy="9144000"/>
@@ -3388,7 +3389,7 @@
           <a:p>
             <a:fld id="{6B66237F-26FC-48D6-ABF0-4BFD7085687A}" type="datetimeFigureOut">
               <a:rPr lang="fr-FR" smtClean="0"/>
-              <a:t>04/11/2015</a:t>
+              <a:t>05/11/2015</a:t>
             </a:fld>
             <a:endParaRPr lang="fr-FR"/>
           </a:p>
@@ -3558,7 +3559,7 @@
           <a:p>
             <a:fld id="{6B66237F-26FC-48D6-ABF0-4BFD7085687A}" type="datetimeFigureOut">
               <a:rPr lang="fr-FR" smtClean="0"/>
-              <a:t>04/11/2015</a:t>
+              <a:t>05/11/2015</a:t>
             </a:fld>
             <a:endParaRPr lang="fr-FR"/>
           </a:p>
@@ -3738,7 +3739,7 @@
           <a:p>
             <a:fld id="{6B66237F-26FC-48D6-ABF0-4BFD7085687A}" type="datetimeFigureOut">
               <a:rPr lang="fr-FR" smtClean="0"/>
-              <a:t>04/11/2015</a:t>
+              <a:t>05/11/2015</a:t>
             </a:fld>
             <a:endParaRPr lang="fr-FR"/>
           </a:p>
@@ -3908,7 +3909,7 @@
           <a:p>
             <a:fld id="{6B66237F-26FC-48D6-ABF0-4BFD7085687A}" type="datetimeFigureOut">
               <a:rPr lang="fr-FR" smtClean="0"/>
-              <a:t>04/11/2015</a:t>
+              <a:t>05/11/2015</a:t>
             </a:fld>
             <a:endParaRPr lang="fr-FR"/>
           </a:p>
@@ -4154,7 +4155,7 @@
           <a:p>
             <a:fld id="{6B66237F-26FC-48D6-ABF0-4BFD7085687A}" type="datetimeFigureOut">
               <a:rPr lang="fr-FR" smtClean="0"/>
-              <a:t>04/11/2015</a:t>
+              <a:t>05/11/2015</a:t>
             </a:fld>
             <a:endParaRPr lang="fr-FR"/>
           </a:p>
@@ -4386,7 +4387,7 @@
           <a:p>
             <a:fld id="{6B66237F-26FC-48D6-ABF0-4BFD7085687A}" type="datetimeFigureOut">
               <a:rPr lang="fr-FR" smtClean="0"/>
-              <a:t>04/11/2015</a:t>
+              <a:t>05/11/2015</a:t>
             </a:fld>
             <a:endParaRPr lang="fr-FR"/>
           </a:p>
@@ -4753,7 +4754,7 @@
           <a:p>
             <a:fld id="{6B66237F-26FC-48D6-ABF0-4BFD7085687A}" type="datetimeFigureOut">
               <a:rPr lang="fr-FR" smtClean="0"/>
-              <a:t>04/11/2015</a:t>
+              <a:t>05/11/2015</a:t>
             </a:fld>
             <a:endParaRPr lang="fr-FR"/>
           </a:p>
@@ -4871,7 +4872,7 @@
           <a:p>
             <a:fld id="{6B66237F-26FC-48D6-ABF0-4BFD7085687A}" type="datetimeFigureOut">
               <a:rPr lang="fr-FR" smtClean="0"/>
-              <a:t>04/11/2015</a:t>
+              <a:t>05/11/2015</a:t>
             </a:fld>
             <a:endParaRPr lang="fr-FR"/>
           </a:p>
@@ -4966,7 +4967,7 @@
           <a:p>
             <a:fld id="{6B66237F-26FC-48D6-ABF0-4BFD7085687A}" type="datetimeFigureOut">
               <a:rPr lang="fr-FR" smtClean="0"/>
-              <a:t>04/11/2015</a:t>
+              <a:t>05/11/2015</a:t>
             </a:fld>
             <a:endParaRPr lang="fr-FR"/>
           </a:p>
@@ -5243,7 +5244,7 @@
           <a:p>
             <a:fld id="{6B66237F-26FC-48D6-ABF0-4BFD7085687A}" type="datetimeFigureOut">
               <a:rPr lang="fr-FR" smtClean="0"/>
-              <a:t>04/11/2015</a:t>
+              <a:t>05/11/2015</a:t>
             </a:fld>
             <a:endParaRPr lang="fr-FR"/>
           </a:p>
@@ -5496,7 +5497,7 @@
           <a:p>
             <a:fld id="{6B66237F-26FC-48D6-ABF0-4BFD7085687A}" type="datetimeFigureOut">
               <a:rPr lang="fr-FR" smtClean="0"/>
-              <a:t>04/11/2015</a:t>
+              <a:t>05/11/2015</a:t>
             </a:fld>
             <a:endParaRPr lang="fr-FR"/>
           </a:p>
@@ -5709,7 +5710,7 @@
           <a:p>
             <a:fld id="{6B66237F-26FC-48D6-ABF0-4BFD7085687A}" type="datetimeFigureOut">
               <a:rPr lang="fr-FR" smtClean="0"/>
-              <a:t>04/11/2015</a:t>
+              <a:t>05/11/2015</a:t>
             </a:fld>
             <a:endParaRPr lang="fr-FR"/>
           </a:p>
@@ -6165,6 +6166,13 @@
   <p:clrMapOvr>
     <a:masterClrMapping/>
   </p:clrMapOvr>
+  <p:timing>
+    <p:tnLst>
+      <p:par>
+        <p:cTn id="1" dur="indefinite" restart="never" nodeType="tmRoot"/>
+      </p:par>
+    </p:tnLst>
+  </p:timing>
 </p:sld>
 </file>
 
@@ -6207,6 +6215,109 @@
           </a:graphicData>
         </a:graphic>
       </p:graphicFrame>
+      <p:sp>
+        <p:nvSpPr>
+          <p:cNvPr id="3" name="Rectangle 2"/>
+          <p:cNvSpPr/>
+          <p:nvPr/>
+        </p:nvSpPr>
+        <p:spPr>
+          <a:xfrm>
+            <a:off x="3389971" y="394192"/>
+            <a:ext cx="5277779" cy="6108208"/>
+          </a:xfrm>
+          <a:prstGeom prst="rect">
+            <a:avLst/>
+          </a:prstGeom>
+          <a:noFill/>
+          <a:ln w="28575">
+            <a:solidFill>
+              <a:schemeClr val="bg1">
+                <a:lumMod val="75000"/>
+              </a:schemeClr>
+            </a:solidFill>
+            <a:prstDash val="dash"/>
+          </a:ln>
+        </p:spPr>
+        <p:style>
+          <a:lnRef idx="2">
+            <a:schemeClr val="accent1">
+              <a:shade val="50000"/>
+            </a:schemeClr>
+          </a:lnRef>
+          <a:fillRef idx="1">
+            <a:schemeClr val="accent1"/>
+          </a:fillRef>
+          <a:effectRef idx="0">
+            <a:schemeClr val="accent1"/>
+          </a:effectRef>
+          <a:fontRef idx="minor">
+            <a:schemeClr val="lt1"/>
+          </a:fontRef>
+        </p:style>
+        <p:txBody>
+          <a:bodyPr rtlCol="0" anchor="ctr"/>
+          <a:lstStyle/>
+          <a:p>
+            <a:pPr algn="ctr"/>
+            <a:endParaRPr lang="fr-FR" dirty="0"/>
+          </a:p>
+        </p:txBody>
+      </p:sp>
+      <p:sp>
+        <p:nvSpPr>
+          <p:cNvPr id="4" name="ZoneTexte 3"/>
+          <p:cNvSpPr txBox="1"/>
+          <p:nvPr/>
+        </p:nvSpPr>
+        <p:spPr>
+          <a:xfrm>
+            <a:off x="3389971" y="394192"/>
+            <a:ext cx="1782287" cy="400110"/>
+          </a:xfrm>
+          <a:prstGeom prst="rect">
+            <a:avLst/>
+          </a:prstGeom>
+          <a:noFill/>
+        </p:spPr>
+        <p:txBody>
+          <a:bodyPr wrap="square" rtlCol="0">
+            <a:spAutoFit/>
+          </a:bodyPr>
+          <a:lstStyle/>
+          <a:p>
+            <a:r>
+              <a:rPr lang="fr-FR" sz="2000" b="1" dirty="0" smtClean="0">
+                <a:solidFill>
+                  <a:schemeClr val="bg1"/>
+                </a:solidFill>
+              </a:rPr>
+              <a:t>Symfony2 </a:t>
+            </a:r>
+            <a:r>
+              <a:rPr lang="fr-FR" sz="2000" b="1" dirty="0" smtClean="0">
+                <a:solidFill>
+                  <a:schemeClr val="bg1"/>
+                </a:solidFill>
+              </a:rPr>
+              <a:t> </a:t>
+            </a:r>
+            <a:r>
+              <a:rPr lang="fr-FR" sz="2000" b="1" dirty="0" err="1" smtClean="0">
+                <a:solidFill>
+                  <a:schemeClr val="bg1"/>
+                </a:solidFill>
+              </a:rPr>
+              <a:t>app</a:t>
+            </a:r>
+            <a:endParaRPr lang="fr-FR" sz="2000" b="1" dirty="0">
+              <a:solidFill>
+                <a:schemeClr val="bg1"/>
+              </a:solidFill>
+            </a:endParaRPr>
+          </a:p>
+        </p:txBody>
+      </p:sp>
     </p:spTree>
     <p:extLst>
       <p:ext uri="{BB962C8B-B14F-4D97-AF65-F5344CB8AC3E}">
@@ -6217,6 +6328,13 @@
   <p:clrMapOvr>
     <a:masterClrMapping/>
   </p:clrMapOvr>
+  <p:timing>
+    <p:tnLst>
+      <p:par>
+        <p:cTn id="1" dur="indefinite" restart="never" nodeType="tmRoot"/>
+      </p:par>
+    </p:tnLst>
+  </p:timing>
 </p:sld>
 </file>
 
@@ -8059,6 +8177,13 @@
   <p:clrMapOvr>
     <a:masterClrMapping/>
   </p:clrMapOvr>
+  <p:timing>
+    <p:tnLst>
+      <p:par>
+        <p:cTn id="1" dur="indefinite" restart="never" nodeType="tmRoot"/>
+      </p:par>
+    </p:tnLst>
+  </p:timing>
 </p:sld>
 </file>
 
@@ -8490,18 +8615,6 @@
               </a:rPr>
               <a:t>Controller</a:t>
             </a:r>
-            <a:r>
-              <a:rPr kumimoji="0" lang="fr-FR" altLang="fr-FR" sz="1400" b="0" i="0" u="none" strike="noStrike" cap="none" normalizeH="0" baseline="0" dirty="0" smtClean="0">
-                <a:ln>
-                  <a:noFill/>
-                </a:ln>
-                <a:effectLst/>
-                <a:latin typeface="Calibri" pitchFamily="34" charset="0"/>
-                <a:ea typeface="Calibri" pitchFamily="34" charset="0"/>
-                <a:cs typeface="Times New Roman" pitchFamily="18" charset="0"/>
-              </a:rPr>
-              <a:t/>
-            </a:r>
             <a:br>
               <a:rPr kumimoji="0" lang="fr-FR" altLang="fr-FR" sz="1400" b="0" i="0" u="none" strike="noStrike" cap="none" normalizeH="0" baseline="0" dirty="0" smtClean="0">
                 <a:ln>
@@ -9097,22 +9210,7 @@
                 <a:ea typeface="Calibri" pitchFamily="34" charset="0"/>
                 <a:cs typeface="Times New Roman" pitchFamily="18" charset="0"/>
               </a:rPr>
-              <a:t>GET </a:t>
-            </a:r>
-            <a:r>
-              <a:rPr kumimoji="0" lang="fr-FR" altLang="fr-FR" sz="1100" b="0" i="0" u="none" strike="noStrike" cap="none" normalizeH="0" baseline="0" dirty="0" smtClean="0">
-                <a:ln>
-                  <a:noFill/>
-                </a:ln>
-                <a:solidFill>
-                  <a:schemeClr val="tx1"/>
-                </a:solidFill>
-                <a:effectLst/>
-                <a:latin typeface="Calibri" pitchFamily="34" charset="0"/>
-                <a:ea typeface="Calibri" pitchFamily="34" charset="0"/>
-                <a:cs typeface="Times New Roman" pitchFamily="18" charset="0"/>
-              </a:rPr>
-              <a:t>/</a:t>
+              <a:t>GET /</a:t>
             </a:r>
             <a:r>
               <a:rPr kumimoji="0" lang="fr-FR" altLang="fr-FR" sz="1100" b="0" i="0" u="none" strike="noStrike" cap="none" normalizeH="0" baseline="0" dirty="0" err="1" smtClean="0">
@@ -9314,22 +9412,7 @@
                 <a:ea typeface="Calibri" pitchFamily="34" charset="0"/>
                 <a:cs typeface="Times New Roman" pitchFamily="18" charset="0"/>
               </a:rPr>
-              <a:t>URL : </a:t>
-            </a:r>
-            <a:r>
-              <a:rPr kumimoji="0" lang="fr-FR" altLang="fr-FR" sz="1100" b="0" i="0" u="none" strike="noStrike" cap="none" normalizeH="0" baseline="0" dirty="0" smtClean="0">
-                <a:ln>
-                  <a:noFill/>
-                </a:ln>
-                <a:solidFill>
-                  <a:schemeClr val="tx1"/>
-                </a:solidFill>
-                <a:effectLst/>
-                <a:latin typeface="Calibri" pitchFamily="34" charset="0"/>
-                <a:ea typeface="Calibri" pitchFamily="34" charset="0"/>
-                <a:cs typeface="Times New Roman" pitchFamily="18" charset="0"/>
-              </a:rPr>
-              <a:t>/</a:t>
+              <a:t>URL : /</a:t>
             </a:r>
             <a:r>
               <a:rPr kumimoji="0" lang="fr-FR" altLang="fr-FR" sz="1100" b="0" i="0" u="none" strike="noStrike" cap="none" normalizeH="0" baseline="0" dirty="0" err="1" smtClean="0">
@@ -9947,6 +10030,1144 @@
     <p:extLst>
       <p:ext uri="{BB962C8B-B14F-4D97-AF65-F5344CB8AC3E}">
         <p14:creationId xmlns:p14="http://schemas.microsoft.com/office/powerpoint/2010/main" val="447024575"/>
+      </p:ext>
+    </p:extLst>
+  </p:cSld>
+  <p:clrMapOvr>
+    <a:masterClrMapping/>
+  </p:clrMapOvr>
+</p:sld>
+</file>
+
+<file path=ppt/slides/slide5.xml><?xml version="1.0" encoding="utf-8"?>
+<p:sld xmlns:a="http://schemas.openxmlformats.org/drawingml/2006/main" xmlns:r="http://schemas.openxmlformats.org/officeDocument/2006/relationships" xmlns:p="http://schemas.openxmlformats.org/presentationml/2006/main">
+  <p:cSld>
+    <p:spTree>
+      <p:nvGrpSpPr>
+        <p:cNvPr id="1" name=""/>
+        <p:cNvGrpSpPr/>
+        <p:nvPr/>
+      </p:nvGrpSpPr>
+      <p:grpSpPr>
+        <a:xfrm>
+          <a:off x="0" y="0"/>
+          <a:ext cx="0" cy="0"/>
+          <a:chOff x="0" y="0"/>
+          <a:chExt cx="0" cy="0"/>
+        </a:xfrm>
+      </p:grpSpPr>
+      <p:sp>
+        <p:nvSpPr>
+          <p:cNvPr id="4" name="Rectangle à coins arrondis 3"/>
+          <p:cNvSpPr/>
+          <p:nvPr/>
+        </p:nvSpPr>
+        <p:spPr>
+          <a:xfrm>
+            <a:off x="622298" y="1085850"/>
+            <a:ext cx="2451100" cy="673100"/>
+          </a:xfrm>
+          <a:prstGeom prst="roundRect">
+            <a:avLst/>
+          </a:prstGeom>
+          <a:solidFill>
+            <a:srgbClr val="B59226"/>
+          </a:solidFill>
+          <a:ln>
+            <a:noFill/>
+          </a:ln>
+        </p:spPr>
+        <p:style>
+          <a:lnRef idx="2">
+            <a:schemeClr val="accent1">
+              <a:shade val="50000"/>
+            </a:schemeClr>
+          </a:lnRef>
+          <a:fillRef idx="1">
+            <a:schemeClr val="accent1"/>
+          </a:fillRef>
+          <a:effectRef idx="0">
+            <a:schemeClr val="accent1"/>
+          </a:effectRef>
+          <a:fontRef idx="minor">
+            <a:schemeClr val="lt1"/>
+          </a:fontRef>
+        </p:style>
+        <p:txBody>
+          <a:bodyPr rtlCol="0" anchor="ctr"/>
+          <a:lstStyle/>
+          <a:p>
+            <a:pPr algn="ctr"/>
+            <a:r>
+              <a:rPr lang="fr-FR" dirty="0" smtClean="0"/>
+              <a:t>A </a:t>
+            </a:r>
+            <a:r>
+              <a:rPr lang="fr-FR" dirty="0" err="1" smtClean="0"/>
+              <a:t>Beer</a:t>
+            </a:r>
+            <a:r>
+              <a:rPr lang="fr-FR" dirty="0" smtClean="0"/>
+              <a:t> Object</a:t>
+            </a:r>
+            <a:endParaRPr lang="fr-FR" dirty="0"/>
+          </a:p>
+        </p:txBody>
+      </p:sp>
+      <p:sp>
+        <p:nvSpPr>
+          <p:cNvPr id="5" name="Rectangle 4"/>
+          <p:cNvSpPr/>
+          <p:nvPr/>
+        </p:nvSpPr>
+        <p:spPr>
+          <a:xfrm>
+            <a:off x="368298" y="1952625"/>
+            <a:ext cx="2959100" cy="2501900"/>
+          </a:xfrm>
+          <a:prstGeom prst="rect">
+            <a:avLst/>
+          </a:prstGeom>
+          <a:solidFill>
+            <a:srgbClr val="9643B7"/>
+          </a:solidFill>
+          <a:ln>
+            <a:noFill/>
+          </a:ln>
+        </p:spPr>
+        <p:style>
+          <a:lnRef idx="2">
+            <a:schemeClr val="accent1">
+              <a:shade val="50000"/>
+            </a:schemeClr>
+          </a:lnRef>
+          <a:fillRef idx="1">
+            <a:schemeClr val="accent1"/>
+          </a:fillRef>
+          <a:effectRef idx="0">
+            <a:schemeClr val="accent1"/>
+          </a:effectRef>
+          <a:fontRef idx="minor">
+            <a:schemeClr val="lt1"/>
+          </a:fontRef>
+        </p:style>
+        <p:txBody>
+          <a:bodyPr rtlCol="0" anchor="ctr"/>
+          <a:lstStyle/>
+          <a:p>
+            <a:r>
+              <a:rPr lang="fr-FR" b="1" dirty="0" smtClean="0"/>
+              <a:t>id</a:t>
+            </a:r>
+            <a:r>
+              <a:rPr lang="fr-FR" dirty="0" smtClean="0"/>
+              <a:t>: 42</a:t>
+            </a:r>
+          </a:p>
+          <a:p>
+            <a:r>
+              <a:rPr lang="fr-FR" b="1" dirty="0" smtClean="0"/>
+              <a:t>Name</a:t>
+            </a:r>
+            <a:r>
+              <a:rPr lang="fr-FR" dirty="0" smtClean="0"/>
+              <a:t>: </a:t>
+            </a:r>
+            <a:r>
+              <a:rPr lang="fr-FR" dirty="0" err="1" smtClean="0"/>
+              <a:t>Kwak</a:t>
+            </a:r>
+            <a:endParaRPr lang="fr-FR" dirty="0" smtClean="0"/>
+          </a:p>
+          <a:p>
+            <a:r>
+              <a:rPr lang="fr-FR" b="1" dirty="0" err="1"/>
+              <a:t>Alcohol</a:t>
+            </a:r>
+            <a:r>
+              <a:rPr lang="fr-FR" dirty="0"/>
+              <a:t>: 8,4</a:t>
+            </a:r>
+            <a:r>
+              <a:rPr lang="fr-FR" dirty="0" smtClean="0"/>
+              <a:t/>
+            </a:r>
+            <a:br>
+              <a:rPr lang="fr-FR" dirty="0" smtClean="0"/>
+            </a:br>
+            <a:r>
+              <a:rPr lang="fr-FR" b="1" dirty="0" smtClean="0"/>
+              <a:t>Description</a:t>
+            </a:r>
+            <a:r>
+              <a:rPr lang="fr-FR" dirty="0" smtClean="0"/>
+              <a:t>: </a:t>
+            </a:r>
+            <a:r>
+              <a:rPr lang="en-US" dirty="0" err="1" smtClean="0"/>
+              <a:t>Pauwel</a:t>
+            </a:r>
+            <a:r>
+              <a:rPr lang="en-US" dirty="0" smtClean="0"/>
+              <a:t> </a:t>
+            </a:r>
+            <a:r>
+              <a:rPr lang="en-US" dirty="0" err="1"/>
+              <a:t>Kwak</a:t>
+            </a:r>
+            <a:r>
+              <a:rPr lang="en-US" dirty="0"/>
+              <a:t> is an amber ale brewed since the 1980s </a:t>
+            </a:r>
+            <a:r>
+              <a:rPr lang="fr-FR" dirty="0"/>
+              <a:t>(…)</a:t>
+            </a:r>
+            <a:r>
+              <a:rPr lang="fr-FR" dirty="0" smtClean="0"/>
+              <a:t/>
+            </a:r>
+            <a:br>
+              <a:rPr lang="fr-FR" dirty="0" smtClean="0"/>
+            </a:br>
+            <a:r>
+              <a:rPr lang="fr-FR" dirty="0" smtClean="0"/>
+              <a:t/>
+            </a:r>
+            <a:br>
+              <a:rPr lang="fr-FR" dirty="0" smtClean="0"/>
+            </a:br>
+            <a:r>
+              <a:rPr lang="fr-FR" dirty="0" smtClean="0"/>
+              <a:t> </a:t>
+            </a:r>
+            <a:endParaRPr lang="fr-FR" dirty="0"/>
+          </a:p>
+        </p:txBody>
+      </p:sp>
+      <p:graphicFrame>
+        <p:nvGraphicFramePr>
+          <p:cNvPr id="6" name="Tableau 5"/>
+          <p:cNvGraphicFramePr>
+            <a:graphicFrameLocks noGrp="1"/>
+          </p:cNvGraphicFramePr>
+          <p:nvPr>
+            <p:extLst>
+              <p:ext uri="{D42A27DB-BD31-4B8C-83A1-F6EECF244321}">
+                <p14:modId xmlns:p14="http://schemas.microsoft.com/office/powerpoint/2010/main" val="3295263777"/>
+              </p:ext>
+            </p:extLst>
+          </p:nvPr>
+        </p:nvGraphicFramePr>
+        <p:xfrm>
+          <a:off x="5372100" y="1962150"/>
+          <a:ext cx="6667500" cy="3393440"/>
+        </p:xfrm>
+        <a:graphic>
+          <a:graphicData uri="http://schemas.openxmlformats.org/drawingml/2006/table">
+            <a:tbl>
+              <a:tblPr firstRow="1" bandRow="1">
+                <a:tableStyleId>{5C22544A-7EE6-4342-B048-85BDC9FD1C3A}</a:tableStyleId>
+              </a:tblPr>
+              <a:tblGrid>
+                <a:gridCol w="1666875"/>
+                <a:gridCol w="1666875"/>
+                <a:gridCol w="1666875"/>
+                <a:gridCol w="1666875"/>
+              </a:tblGrid>
+              <a:tr h="370840">
+                <a:tc>
+                  <a:txBody>
+                    <a:bodyPr/>
+                    <a:lstStyle/>
+                    <a:p>
+                      <a:r>
+                        <a:rPr lang="fr-FR" dirty="0" smtClean="0"/>
+                        <a:t>Id</a:t>
+                      </a:r>
+                      <a:endParaRPr lang="fr-FR" dirty="0"/>
+                    </a:p>
+                  </a:txBody>
+                  <a:tcPr>
+                    <a:lnL w="12700" cmpd="sng">
+                      <a:noFill/>
+                    </a:lnL>
+                    <a:lnR w="12700" cmpd="sng">
+                      <a:noFill/>
+                    </a:lnR>
+                    <a:lnT w="12700" cmpd="sng">
+                      <a:noFill/>
+                    </a:lnT>
+                    <a:lnB w="38100" cmpd="sng">
+                      <a:noFill/>
+                    </a:lnB>
+                    <a:lnTlToBr w="12700" cmpd="sng">
+                      <a:noFill/>
+                      <a:prstDash val="solid"/>
+                    </a:lnTlToBr>
+                    <a:lnBlToTr w="12700" cmpd="sng">
+                      <a:noFill/>
+                      <a:prstDash val="solid"/>
+                    </a:lnBlToTr>
+                    <a:solidFill>
+                      <a:srgbClr val="B59226"/>
+                    </a:solidFill>
+                  </a:tcPr>
+                </a:tc>
+                <a:tc>
+                  <a:txBody>
+                    <a:bodyPr/>
+                    <a:lstStyle/>
+                    <a:p>
+                      <a:r>
+                        <a:rPr lang="fr-FR" dirty="0" err="1" smtClean="0"/>
+                        <a:t>name</a:t>
+                      </a:r>
+                      <a:endParaRPr lang="fr-FR" dirty="0"/>
+                    </a:p>
+                  </a:txBody>
+                  <a:tcPr>
+                    <a:lnL w="12700" cmpd="sng">
+                      <a:noFill/>
+                    </a:lnL>
+                    <a:lnR w="12700" cmpd="sng">
+                      <a:noFill/>
+                    </a:lnR>
+                    <a:lnT w="12700" cmpd="sng">
+                      <a:noFill/>
+                    </a:lnT>
+                    <a:lnB w="38100" cmpd="sng">
+                      <a:noFill/>
+                    </a:lnB>
+                    <a:lnTlToBr w="12700" cmpd="sng">
+                      <a:noFill/>
+                      <a:prstDash val="solid"/>
+                    </a:lnTlToBr>
+                    <a:lnBlToTr w="12700" cmpd="sng">
+                      <a:noFill/>
+                      <a:prstDash val="solid"/>
+                    </a:lnBlToTr>
+                    <a:solidFill>
+                      <a:srgbClr val="B59226"/>
+                    </a:solidFill>
+                  </a:tcPr>
+                </a:tc>
+                <a:tc>
+                  <a:txBody>
+                    <a:bodyPr/>
+                    <a:lstStyle/>
+                    <a:p>
+                      <a:r>
+                        <a:rPr lang="fr-FR" dirty="0" err="1" smtClean="0"/>
+                        <a:t>alcohol</a:t>
+                      </a:r>
+                      <a:endParaRPr lang="fr-FR" dirty="0"/>
+                    </a:p>
+                  </a:txBody>
+                  <a:tcPr>
+                    <a:lnL w="12700" cmpd="sng">
+                      <a:noFill/>
+                    </a:lnL>
+                    <a:lnR w="12700" cmpd="sng">
+                      <a:noFill/>
+                    </a:lnR>
+                    <a:lnT w="12700" cmpd="sng">
+                      <a:noFill/>
+                    </a:lnT>
+                    <a:lnB w="38100" cmpd="sng">
+                      <a:noFill/>
+                    </a:lnB>
+                    <a:lnTlToBr w="12700" cmpd="sng">
+                      <a:noFill/>
+                      <a:prstDash val="solid"/>
+                    </a:lnTlToBr>
+                    <a:lnBlToTr w="12700" cmpd="sng">
+                      <a:noFill/>
+                      <a:prstDash val="solid"/>
+                    </a:lnBlToTr>
+                    <a:solidFill>
+                      <a:srgbClr val="B59226"/>
+                    </a:solidFill>
+                  </a:tcPr>
+                </a:tc>
+                <a:tc>
+                  <a:txBody>
+                    <a:bodyPr/>
+                    <a:lstStyle/>
+                    <a:p>
+                      <a:r>
+                        <a:rPr lang="fr-FR" dirty="0" smtClean="0"/>
+                        <a:t>description</a:t>
+                      </a:r>
+                      <a:endParaRPr lang="fr-FR" dirty="0"/>
+                    </a:p>
+                  </a:txBody>
+                  <a:tcPr>
+                    <a:lnL w="12700" cmpd="sng">
+                      <a:noFill/>
+                    </a:lnL>
+                    <a:lnR w="12700" cmpd="sng">
+                      <a:noFill/>
+                    </a:lnR>
+                    <a:lnT w="12700" cmpd="sng">
+                      <a:noFill/>
+                    </a:lnT>
+                    <a:lnB w="38100" cmpd="sng">
+                      <a:noFill/>
+                    </a:lnB>
+                    <a:lnTlToBr w="12700" cmpd="sng">
+                      <a:noFill/>
+                      <a:prstDash val="solid"/>
+                    </a:lnTlToBr>
+                    <a:lnBlToTr w="12700" cmpd="sng">
+                      <a:noFill/>
+                      <a:prstDash val="solid"/>
+                    </a:lnBlToTr>
+                    <a:solidFill>
+                      <a:srgbClr val="B59226"/>
+                    </a:solidFill>
+                  </a:tcPr>
+                </a:tc>
+              </a:tr>
+              <a:tr h="370840">
+                <a:tc>
+                  <a:txBody>
+                    <a:bodyPr/>
+                    <a:lstStyle/>
+                    <a:p>
+                      <a:r>
+                        <a:rPr lang="fr-FR" dirty="0" smtClean="0">
+                          <a:solidFill>
+                            <a:schemeClr val="bg1"/>
+                          </a:solidFill>
+                        </a:rPr>
+                        <a:t>42</a:t>
+                      </a:r>
+                      <a:endParaRPr lang="fr-FR" dirty="0">
+                        <a:solidFill>
+                          <a:schemeClr val="bg1"/>
+                        </a:solidFill>
+                      </a:endParaRPr>
+                    </a:p>
+                  </a:txBody>
+                  <a:tcPr>
+                    <a:lnL w="12700" cmpd="sng">
+                      <a:noFill/>
+                    </a:lnL>
+                    <a:lnR w="12700" cmpd="sng">
+                      <a:noFill/>
+                    </a:lnR>
+                    <a:lnT w="38100" cmpd="sng">
+                      <a:noFill/>
+                    </a:lnT>
+                    <a:lnB w="12700" cmpd="sng">
+                      <a:noFill/>
+                    </a:lnB>
+                    <a:lnTlToBr w="12700" cmpd="sng">
+                      <a:noFill/>
+                      <a:prstDash val="solid"/>
+                    </a:lnTlToBr>
+                    <a:lnBlToTr w="12700" cmpd="sng">
+                      <a:noFill/>
+                      <a:prstDash val="solid"/>
+                    </a:lnBlToTr>
+                    <a:solidFill>
+                      <a:srgbClr val="9643B7"/>
+                    </a:solidFill>
+                  </a:tcPr>
+                </a:tc>
+                <a:tc>
+                  <a:txBody>
+                    <a:bodyPr/>
+                    <a:lstStyle/>
+                    <a:p>
+                      <a:r>
+                        <a:rPr lang="fr-FR" dirty="0" err="1" smtClean="0">
+                          <a:solidFill>
+                            <a:schemeClr val="bg1"/>
+                          </a:solidFill>
+                        </a:rPr>
+                        <a:t>Kwak</a:t>
+                      </a:r>
+                      <a:endParaRPr lang="fr-FR" dirty="0">
+                        <a:solidFill>
+                          <a:schemeClr val="bg1"/>
+                        </a:solidFill>
+                      </a:endParaRPr>
+                    </a:p>
+                  </a:txBody>
+                  <a:tcPr>
+                    <a:lnL w="12700" cmpd="sng">
+                      <a:noFill/>
+                    </a:lnL>
+                    <a:lnR w="12700" cmpd="sng">
+                      <a:noFill/>
+                    </a:lnR>
+                    <a:lnT w="38100" cmpd="sng">
+                      <a:noFill/>
+                    </a:lnT>
+                    <a:lnB w="12700" cmpd="sng">
+                      <a:noFill/>
+                    </a:lnB>
+                    <a:lnTlToBr w="12700" cmpd="sng">
+                      <a:noFill/>
+                      <a:prstDash val="solid"/>
+                    </a:lnTlToBr>
+                    <a:lnBlToTr w="12700" cmpd="sng">
+                      <a:noFill/>
+                      <a:prstDash val="solid"/>
+                    </a:lnBlToTr>
+                    <a:solidFill>
+                      <a:srgbClr val="9643B7"/>
+                    </a:solidFill>
+                  </a:tcPr>
+                </a:tc>
+                <a:tc>
+                  <a:txBody>
+                    <a:bodyPr/>
+                    <a:lstStyle/>
+                    <a:p>
+                      <a:r>
+                        <a:rPr lang="fr-FR" dirty="0" smtClean="0">
+                          <a:solidFill>
+                            <a:schemeClr val="bg1"/>
+                          </a:solidFill>
+                        </a:rPr>
+                        <a:t>8,4</a:t>
+                      </a:r>
+                      <a:endParaRPr lang="fr-FR" dirty="0">
+                        <a:solidFill>
+                          <a:schemeClr val="bg1"/>
+                        </a:solidFill>
+                      </a:endParaRPr>
+                    </a:p>
+                  </a:txBody>
+                  <a:tcPr>
+                    <a:lnL w="12700" cmpd="sng">
+                      <a:noFill/>
+                    </a:lnL>
+                    <a:lnR w="12700" cmpd="sng">
+                      <a:noFill/>
+                    </a:lnR>
+                    <a:lnT w="38100" cmpd="sng">
+                      <a:noFill/>
+                    </a:lnT>
+                    <a:lnB w="12700" cmpd="sng">
+                      <a:noFill/>
+                    </a:lnB>
+                    <a:lnTlToBr w="12700" cmpd="sng">
+                      <a:noFill/>
+                      <a:prstDash val="solid"/>
+                    </a:lnTlToBr>
+                    <a:lnBlToTr w="12700" cmpd="sng">
+                      <a:noFill/>
+                      <a:prstDash val="solid"/>
+                    </a:lnBlToTr>
+                    <a:solidFill>
+                      <a:srgbClr val="9643B7"/>
+                    </a:solidFill>
+                  </a:tcPr>
+                </a:tc>
+                <a:tc>
+                  <a:txBody>
+                    <a:bodyPr/>
+                    <a:lstStyle/>
+                    <a:p>
+                      <a:r>
+                        <a:rPr lang="en-US" dirty="0" err="1" smtClean="0">
+                          <a:solidFill>
+                            <a:schemeClr val="bg1"/>
+                          </a:solidFill>
+                        </a:rPr>
+                        <a:t>Pauwel</a:t>
+                      </a:r>
+                      <a:r>
+                        <a:rPr lang="en-US" dirty="0" smtClean="0">
+                          <a:solidFill>
+                            <a:schemeClr val="bg1"/>
+                          </a:solidFill>
+                        </a:rPr>
+                        <a:t> </a:t>
+                      </a:r>
+                      <a:r>
+                        <a:rPr lang="en-US" dirty="0" err="1" smtClean="0">
+                          <a:solidFill>
+                            <a:schemeClr val="bg1"/>
+                          </a:solidFill>
+                        </a:rPr>
+                        <a:t>Kwak</a:t>
+                      </a:r>
+                      <a:r>
+                        <a:rPr lang="en-US" dirty="0" smtClean="0">
+                          <a:solidFill>
+                            <a:schemeClr val="bg1"/>
+                          </a:solidFill>
+                        </a:rPr>
+                        <a:t> is an amber ale brewed since the 1980s </a:t>
+                      </a:r>
+                      <a:r>
+                        <a:rPr lang="fr-FR" dirty="0" smtClean="0">
+                          <a:solidFill>
+                            <a:schemeClr val="bg1"/>
+                          </a:solidFill>
+                        </a:rPr>
+                        <a:t>(…)</a:t>
+                      </a:r>
+                      <a:endParaRPr lang="fr-FR" dirty="0">
+                        <a:solidFill>
+                          <a:schemeClr val="bg1"/>
+                        </a:solidFill>
+                      </a:endParaRPr>
+                    </a:p>
+                  </a:txBody>
+                  <a:tcPr>
+                    <a:lnL w="12700" cmpd="sng">
+                      <a:noFill/>
+                    </a:lnL>
+                    <a:lnR w="12700" cmpd="sng">
+                      <a:noFill/>
+                    </a:lnR>
+                    <a:lnT w="38100" cmpd="sng">
+                      <a:noFill/>
+                    </a:lnT>
+                    <a:lnB w="12700" cmpd="sng">
+                      <a:noFill/>
+                    </a:lnB>
+                    <a:lnTlToBr w="12700" cmpd="sng">
+                      <a:noFill/>
+                      <a:prstDash val="solid"/>
+                    </a:lnTlToBr>
+                    <a:lnBlToTr w="12700" cmpd="sng">
+                      <a:noFill/>
+                      <a:prstDash val="solid"/>
+                    </a:lnBlToTr>
+                    <a:solidFill>
+                      <a:srgbClr val="9643B7"/>
+                    </a:solidFill>
+                  </a:tcPr>
+                </a:tc>
+              </a:tr>
+              <a:tr h="370840">
+                <a:tc>
+                  <a:txBody>
+                    <a:bodyPr/>
+                    <a:lstStyle/>
+                    <a:p>
+                      <a:r>
+                        <a:rPr lang="fr-FR" dirty="0" smtClean="0"/>
+                        <a:t>43</a:t>
+                      </a:r>
+                      <a:endParaRPr lang="fr-FR" dirty="0"/>
+                    </a:p>
+                  </a:txBody>
+                  <a:tcPr>
+                    <a:lnL w="12700" cmpd="sng">
+                      <a:noFill/>
+                    </a:lnL>
+                    <a:lnR w="12700" cmpd="sng">
+                      <a:noFill/>
+                    </a:lnR>
+                    <a:lnT w="12700" cmpd="sng">
+                      <a:noFill/>
+                    </a:lnT>
+                    <a:lnB w="12700" cmpd="sng">
+                      <a:noFill/>
+                    </a:lnB>
+                    <a:lnTlToBr w="12700" cmpd="sng">
+                      <a:noFill/>
+                      <a:prstDash val="solid"/>
+                    </a:lnTlToBr>
+                    <a:lnBlToTr w="12700" cmpd="sng">
+                      <a:noFill/>
+                      <a:prstDash val="solid"/>
+                    </a:lnBlToTr>
+                  </a:tcPr>
+                </a:tc>
+                <a:tc>
+                  <a:txBody>
+                    <a:bodyPr/>
+                    <a:lstStyle/>
+                    <a:p>
+                      <a:r>
+                        <a:rPr lang="fr-FR" dirty="0" smtClean="0"/>
+                        <a:t>St </a:t>
+                      </a:r>
+                      <a:r>
+                        <a:rPr lang="fr-FR" dirty="0" err="1" smtClean="0"/>
+                        <a:t>Bernardus</a:t>
+                      </a:r>
+                      <a:r>
+                        <a:rPr lang="fr-FR" dirty="0" smtClean="0"/>
+                        <a:t> </a:t>
+                      </a:r>
+                      <a:r>
+                        <a:rPr lang="fr-FR" dirty="0" err="1" smtClean="0"/>
+                        <a:t>Tripel</a:t>
+                      </a:r>
+                      <a:endParaRPr lang="fr-FR" dirty="0"/>
+                    </a:p>
+                  </a:txBody>
+                  <a:tcPr>
+                    <a:lnL w="12700" cmpd="sng">
+                      <a:noFill/>
+                    </a:lnL>
+                    <a:lnR w="12700" cmpd="sng">
+                      <a:noFill/>
+                    </a:lnR>
+                    <a:lnT w="12700" cmpd="sng">
+                      <a:noFill/>
+                    </a:lnT>
+                    <a:lnB w="12700" cmpd="sng">
+                      <a:noFill/>
+                    </a:lnB>
+                    <a:lnTlToBr w="12700" cmpd="sng">
+                      <a:noFill/>
+                      <a:prstDash val="solid"/>
+                    </a:lnTlToBr>
+                    <a:lnBlToTr w="12700" cmpd="sng">
+                      <a:noFill/>
+                      <a:prstDash val="solid"/>
+                    </a:lnBlToTr>
+                  </a:tcPr>
+                </a:tc>
+                <a:tc>
+                  <a:txBody>
+                    <a:bodyPr/>
+                    <a:lstStyle/>
+                    <a:p>
+                      <a:r>
+                        <a:rPr lang="fr-FR" dirty="0" smtClean="0"/>
+                        <a:t>10,5</a:t>
+                      </a:r>
+                      <a:endParaRPr lang="fr-FR" dirty="0"/>
+                    </a:p>
+                  </a:txBody>
+                  <a:tcPr>
+                    <a:lnL w="12700" cmpd="sng">
+                      <a:noFill/>
+                    </a:lnL>
+                    <a:lnR w="12700" cmpd="sng">
+                      <a:noFill/>
+                    </a:lnR>
+                    <a:lnT w="12700" cmpd="sng">
+                      <a:noFill/>
+                    </a:lnT>
+                    <a:lnB w="12700" cmpd="sng">
+                      <a:noFill/>
+                    </a:lnB>
+                    <a:lnTlToBr w="12700" cmpd="sng">
+                      <a:noFill/>
+                      <a:prstDash val="solid"/>
+                    </a:lnTlToBr>
+                    <a:lnBlToTr w="12700" cmpd="sng">
+                      <a:noFill/>
+                      <a:prstDash val="solid"/>
+                    </a:lnBlToTr>
+                  </a:tcPr>
+                </a:tc>
+                <a:tc>
+                  <a:txBody>
+                    <a:bodyPr/>
+                    <a:lstStyle/>
+                    <a:p>
+                      <a:r>
+                        <a:rPr lang="en-US" dirty="0" smtClean="0"/>
+                        <a:t>This beer, with high fermentation, has a pale amber </a:t>
+                      </a:r>
+                      <a:r>
+                        <a:rPr lang="en-US" dirty="0" err="1" smtClean="0"/>
+                        <a:t>colour</a:t>
+                      </a:r>
+                      <a:endParaRPr lang="fr-FR" dirty="0"/>
+                    </a:p>
+                  </a:txBody>
+                  <a:tcPr>
+                    <a:lnL w="12700" cmpd="sng">
+                      <a:noFill/>
+                    </a:lnL>
+                    <a:lnR w="12700" cmpd="sng">
+                      <a:noFill/>
+                    </a:lnR>
+                    <a:lnT w="12700" cmpd="sng">
+                      <a:noFill/>
+                    </a:lnT>
+                    <a:lnB w="12700" cmpd="sng">
+                      <a:noFill/>
+                    </a:lnB>
+                    <a:lnTlToBr w="12700" cmpd="sng">
+                      <a:noFill/>
+                      <a:prstDash val="solid"/>
+                    </a:lnTlToBr>
+                    <a:lnBlToTr w="12700" cmpd="sng">
+                      <a:noFill/>
+                      <a:prstDash val="solid"/>
+                    </a:lnBlToTr>
+                  </a:tcPr>
+                </a:tc>
+              </a:tr>
+              <a:tr h="370840">
+                <a:tc>
+                  <a:txBody>
+                    <a:bodyPr/>
+                    <a:lstStyle/>
+                    <a:p>
+                      <a:r>
+                        <a:rPr lang="fr-FR" dirty="0" smtClean="0"/>
+                        <a:t>…</a:t>
+                      </a:r>
+                      <a:endParaRPr lang="fr-FR" dirty="0"/>
+                    </a:p>
+                  </a:txBody>
+                  <a:tcPr>
+                    <a:lnL w="12700" cmpd="sng">
+                      <a:noFill/>
+                    </a:lnL>
+                    <a:lnR w="12700" cmpd="sng">
+                      <a:noFill/>
+                    </a:lnR>
+                    <a:lnT w="12700" cmpd="sng">
+                      <a:noFill/>
+                    </a:lnT>
+                    <a:lnB w="12700" cmpd="sng">
+                      <a:noFill/>
+                    </a:lnB>
+                    <a:lnTlToBr w="12700" cmpd="sng">
+                      <a:noFill/>
+                      <a:prstDash val="solid"/>
+                    </a:lnTlToBr>
+                    <a:lnBlToTr w="12700" cmpd="sng">
+                      <a:noFill/>
+                      <a:prstDash val="solid"/>
+                    </a:lnBlToTr>
+                  </a:tcPr>
+                </a:tc>
+                <a:tc>
+                  <a:txBody>
+                    <a:bodyPr/>
+                    <a:lstStyle/>
+                    <a:p>
+                      <a:r>
+                        <a:rPr lang="fr-FR" dirty="0" smtClean="0"/>
+                        <a:t>…</a:t>
+                      </a:r>
+                      <a:endParaRPr lang="fr-FR" dirty="0"/>
+                    </a:p>
+                  </a:txBody>
+                  <a:tcPr>
+                    <a:lnL w="12700" cmpd="sng">
+                      <a:noFill/>
+                    </a:lnL>
+                    <a:lnR w="12700" cmpd="sng">
+                      <a:noFill/>
+                    </a:lnR>
+                    <a:lnT w="12700" cmpd="sng">
+                      <a:noFill/>
+                    </a:lnT>
+                    <a:lnB w="12700" cmpd="sng">
+                      <a:noFill/>
+                    </a:lnB>
+                    <a:lnTlToBr w="12700" cmpd="sng">
+                      <a:noFill/>
+                      <a:prstDash val="solid"/>
+                    </a:lnTlToBr>
+                    <a:lnBlToTr w="12700" cmpd="sng">
+                      <a:noFill/>
+                      <a:prstDash val="solid"/>
+                    </a:lnBlToTr>
+                  </a:tcPr>
+                </a:tc>
+                <a:tc>
+                  <a:txBody>
+                    <a:bodyPr/>
+                    <a:lstStyle/>
+                    <a:p>
+                      <a:r>
+                        <a:rPr lang="fr-FR" dirty="0" smtClean="0"/>
+                        <a:t>…</a:t>
+                      </a:r>
+                      <a:endParaRPr lang="fr-FR" dirty="0"/>
+                    </a:p>
+                  </a:txBody>
+                  <a:tcPr>
+                    <a:lnL w="12700" cmpd="sng">
+                      <a:noFill/>
+                    </a:lnL>
+                    <a:lnR w="12700" cmpd="sng">
+                      <a:noFill/>
+                    </a:lnR>
+                    <a:lnT w="12700" cmpd="sng">
+                      <a:noFill/>
+                    </a:lnT>
+                    <a:lnB w="12700" cmpd="sng">
+                      <a:noFill/>
+                    </a:lnB>
+                    <a:lnTlToBr w="12700" cmpd="sng">
+                      <a:noFill/>
+                      <a:prstDash val="solid"/>
+                    </a:lnTlToBr>
+                    <a:lnBlToTr w="12700" cmpd="sng">
+                      <a:noFill/>
+                      <a:prstDash val="solid"/>
+                    </a:lnBlToTr>
+                  </a:tcPr>
+                </a:tc>
+                <a:tc>
+                  <a:txBody>
+                    <a:bodyPr/>
+                    <a:lstStyle/>
+                    <a:p>
+                      <a:r>
+                        <a:rPr lang="fr-FR" dirty="0" smtClean="0"/>
+                        <a:t>…</a:t>
+                      </a:r>
+                      <a:endParaRPr lang="fr-FR" dirty="0"/>
+                    </a:p>
+                  </a:txBody>
+                  <a:tcPr>
+                    <a:lnL w="12700" cmpd="sng">
+                      <a:noFill/>
+                    </a:lnL>
+                    <a:lnR w="12700" cmpd="sng">
+                      <a:noFill/>
+                    </a:lnR>
+                    <a:lnT w="12700" cmpd="sng">
+                      <a:noFill/>
+                    </a:lnT>
+                    <a:lnB w="12700" cmpd="sng">
+                      <a:noFill/>
+                    </a:lnB>
+                    <a:lnTlToBr w="12700" cmpd="sng">
+                      <a:noFill/>
+                      <a:prstDash val="solid"/>
+                    </a:lnTlToBr>
+                    <a:lnBlToTr w="12700" cmpd="sng">
+                      <a:noFill/>
+                      <a:prstDash val="solid"/>
+                    </a:lnBlToTr>
+                  </a:tcPr>
+                </a:tc>
+              </a:tr>
+            </a:tbl>
+          </a:graphicData>
+        </a:graphic>
+      </p:graphicFrame>
+      <p:sp>
+        <p:nvSpPr>
+          <p:cNvPr id="8" name="Rectangle à coins arrondis 7"/>
+          <p:cNvSpPr/>
+          <p:nvPr/>
+        </p:nvSpPr>
+        <p:spPr>
+          <a:xfrm>
+            <a:off x="7531100" y="1085850"/>
+            <a:ext cx="2349500" cy="673100"/>
+          </a:xfrm>
+          <a:prstGeom prst="roundRect">
+            <a:avLst/>
+          </a:prstGeom>
+          <a:solidFill>
+            <a:srgbClr val="B59226"/>
+          </a:solidFill>
+          <a:ln>
+            <a:noFill/>
+          </a:ln>
+        </p:spPr>
+        <p:style>
+          <a:lnRef idx="2">
+            <a:schemeClr val="accent1">
+              <a:shade val="50000"/>
+            </a:schemeClr>
+          </a:lnRef>
+          <a:fillRef idx="1">
+            <a:schemeClr val="accent1"/>
+          </a:fillRef>
+          <a:effectRef idx="0">
+            <a:schemeClr val="accent1"/>
+          </a:effectRef>
+          <a:fontRef idx="minor">
+            <a:schemeClr val="lt1"/>
+          </a:fontRef>
+        </p:style>
+        <p:txBody>
+          <a:bodyPr rtlCol="0" anchor="ctr"/>
+          <a:lstStyle/>
+          <a:p>
+            <a:pPr algn="ctr"/>
+            <a:r>
+              <a:rPr lang="fr-FR" dirty="0" smtClean="0"/>
+              <a:t>Table: </a:t>
+            </a:r>
+            <a:r>
+              <a:rPr lang="fr-FR" dirty="0" err="1" smtClean="0"/>
+              <a:t>beer</a:t>
+            </a:r>
+            <a:endParaRPr lang="fr-FR" dirty="0"/>
+          </a:p>
+        </p:txBody>
+      </p:sp>
+      <p:sp>
+        <p:nvSpPr>
+          <p:cNvPr id="9" name="Flèche droite 8"/>
+          <p:cNvSpPr/>
+          <p:nvPr/>
+        </p:nvSpPr>
+        <p:spPr>
+          <a:xfrm>
+            <a:off x="3384548" y="2286000"/>
+            <a:ext cx="1930400" cy="917575"/>
+          </a:xfrm>
+          <a:prstGeom prst="rightArrow">
+            <a:avLst>
+              <a:gd name="adj1" fmla="val 50000"/>
+              <a:gd name="adj2" fmla="val 51384"/>
+            </a:avLst>
+          </a:prstGeom>
+          <a:solidFill>
+            <a:srgbClr val="448FAF"/>
+          </a:solidFill>
+        </p:spPr>
+        <p:style>
+          <a:lnRef idx="2">
+            <a:schemeClr val="accent1">
+              <a:shade val="50000"/>
+            </a:schemeClr>
+          </a:lnRef>
+          <a:fillRef idx="1">
+            <a:schemeClr val="accent1"/>
+          </a:fillRef>
+          <a:effectRef idx="0">
+            <a:schemeClr val="accent1"/>
+          </a:effectRef>
+          <a:fontRef idx="minor">
+            <a:schemeClr val="lt1"/>
+          </a:fontRef>
+        </p:style>
+        <p:txBody>
+          <a:bodyPr rtlCol="0" anchor="ctr"/>
+          <a:lstStyle/>
+          <a:p>
+            <a:pPr algn="ctr"/>
+            <a:endParaRPr lang="fr-FR"/>
+          </a:p>
+        </p:txBody>
+      </p:sp>
+      <p:sp>
+        <p:nvSpPr>
+          <p:cNvPr id="11" name="Flèche droite 10"/>
+          <p:cNvSpPr/>
+          <p:nvPr/>
+        </p:nvSpPr>
+        <p:spPr>
+          <a:xfrm rot="10800000">
+            <a:off x="3384549" y="3362007"/>
+            <a:ext cx="1930400" cy="917575"/>
+          </a:xfrm>
+          <a:prstGeom prst="rightArrow">
+            <a:avLst>
+              <a:gd name="adj1" fmla="val 50000"/>
+              <a:gd name="adj2" fmla="val 51384"/>
+            </a:avLst>
+          </a:prstGeom>
+          <a:solidFill>
+            <a:srgbClr val="448FAF"/>
+          </a:solidFill>
+        </p:spPr>
+        <p:style>
+          <a:lnRef idx="2">
+            <a:schemeClr val="accent1">
+              <a:shade val="50000"/>
+            </a:schemeClr>
+          </a:lnRef>
+          <a:fillRef idx="1">
+            <a:schemeClr val="accent1"/>
+          </a:fillRef>
+          <a:effectRef idx="0">
+            <a:schemeClr val="accent1"/>
+          </a:effectRef>
+          <a:fontRef idx="minor">
+            <a:schemeClr val="lt1"/>
+          </a:fontRef>
+        </p:style>
+        <p:txBody>
+          <a:bodyPr rtlCol="0" anchor="ctr"/>
+          <a:lstStyle/>
+          <a:p>
+            <a:pPr algn="ctr"/>
+            <a:endParaRPr lang="fr-FR"/>
+          </a:p>
+        </p:txBody>
+      </p:sp>
+      <p:sp>
+        <p:nvSpPr>
+          <p:cNvPr id="7" name="Rectangle 6"/>
+          <p:cNvSpPr/>
+          <p:nvPr/>
+        </p:nvSpPr>
+        <p:spPr>
+          <a:xfrm rot="5400000">
+            <a:off x="1689099" y="3110388"/>
+            <a:ext cx="5321299" cy="503238"/>
+          </a:xfrm>
+          <a:prstGeom prst="rect">
+            <a:avLst/>
+          </a:prstGeom>
+          <a:solidFill>
+            <a:srgbClr val="F7CE3A"/>
+          </a:solidFill>
+          <a:ln>
+            <a:solidFill>
+              <a:schemeClr val="tx1"/>
+            </a:solidFill>
+          </a:ln>
+          <a:effectLst>
+            <a:outerShdw blurRad="50800" dist="38100" dir="2700000" algn="tl" rotWithShape="0">
+              <a:prstClr val="black">
+                <a:alpha val="40000"/>
+              </a:prstClr>
+            </a:outerShdw>
+          </a:effectLst>
+        </p:spPr>
+        <p:style>
+          <a:lnRef idx="2">
+            <a:schemeClr val="accent1">
+              <a:shade val="50000"/>
+            </a:schemeClr>
+          </a:lnRef>
+          <a:fillRef idx="1">
+            <a:schemeClr val="accent1"/>
+          </a:fillRef>
+          <a:effectRef idx="0">
+            <a:schemeClr val="accent1"/>
+          </a:effectRef>
+          <a:fontRef idx="minor">
+            <a:schemeClr val="lt1"/>
+          </a:fontRef>
+        </p:style>
+        <p:txBody>
+          <a:bodyPr rtlCol="0" anchor="ctr"/>
+          <a:lstStyle/>
+          <a:p>
+            <a:pPr algn="ctr"/>
+            <a:r>
+              <a:rPr lang="fr-FR" b="1" dirty="0" smtClean="0">
+                <a:solidFill>
+                  <a:schemeClr val="tx1"/>
+                </a:solidFill>
+              </a:rPr>
+              <a:t>Doctrine</a:t>
+            </a:r>
+            <a:endParaRPr lang="fr-FR" b="1" dirty="0">
+              <a:solidFill>
+                <a:schemeClr val="tx1"/>
+              </a:solidFill>
+            </a:endParaRPr>
+          </a:p>
+        </p:txBody>
+      </p:sp>
+    </p:spTree>
+    <p:extLst>
+      <p:ext uri="{BB962C8B-B14F-4D97-AF65-F5344CB8AC3E}">
+        <p14:creationId xmlns:p14="http://schemas.microsoft.com/office/powerpoint/2010/main" val="3315425650"/>
       </p:ext>
     </p:extLst>
   </p:cSld>

</xml_diff>

<commit_message>
Add analytics + new slides : PHP, Silex&SF
</commit_message>
<xml_diff>
--- a/slides/symfony2-basics-conserto/img/schema.pptx
+++ b/slides/symfony2-basics-conserto/img/schema.pptx
@@ -7,9 +7,8 @@
   <p:sldIdLst>
     <p:sldId id="256" r:id="rId2"/>
     <p:sldId id="257" r:id="rId3"/>
-    <p:sldId id="258" r:id="rId4"/>
-    <p:sldId id="259" r:id="rId5"/>
-    <p:sldId id="260" r:id="rId6"/>
+    <p:sldId id="259" r:id="rId4"/>
+    <p:sldId id="260" r:id="rId5"/>
   </p:sldIdLst>
   <p:sldSz cx="12192000" cy="6858000"/>
   <p:notesSz cx="6858000" cy="9144000"/>
@@ -3389,7 +3388,7 @@
           <a:p>
             <a:fld id="{6B66237F-26FC-48D6-ABF0-4BFD7085687A}" type="datetimeFigureOut">
               <a:rPr lang="fr-FR" smtClean="0"/>
-              <a:t>05/11/2015</a:t>
+              <a:t>09/11/2015</a:t>
             </a:fld>
             <a:endParaRPr lang="fr-FR"/>
           </a:p>
@@ -3559,7 +3558,7 @@
           <a:p>
             <a:fld id="{6B66237F-26FC-48D6-ABF0-4BFD7085687A}" type="datetimeFigureOut">
               <a:rPr lang="fr-FR" smtClean="0"/>
-              <a:t>05/11/2015</a:t>
+              <a:t>09/11/2015</a:t>
             </a:fld>
             <a:endParaRPr lang="fr-FR"/>
           </a:p>
@@ -3739,7 +3738,7 @@
           <a:p>
             <a:fld id="{6B66237F-26FC-48D6-ABF0-4BFD7085687A}" type="datetimeFigureOut">
               <a:rPr lang="fr-FR" smtClean="0"/>
-              <a:t>05/11/2015</a:t>
+              <a:t>09/11/2015</a:t>
             </a:fld>
             <a:endParaRPr lang="fr-FR"/>
           </a:p>
@@ -3909,7 +3908,7 @@
           <a:p>
             <a:fld id="{6B66237F-26FC-48D6-ABF0-4BFD7085687A}" type="datetimeFigureOut">
               <a:rPr lang="fr-FR" smtClean="0"/>
-              <a:t>05/11/2015</a:t>
+              <a:t>09/11/2015</a:t>
             </a:fld>
             <a:endParaRPr lang="fr-FR"/>
           </a:p>
@@ -4155,7 +4154,7 @@
           <a:p>
             <a:fld id="{6B66237F-26FC-48D6-ABF0-4BFD7085687A}" type="datetimeFigureOut">
               <a:rPr lang="fr-FR" smtClean="0"/>
-              <a:t>05/11/2015</a:t>
+              <a:t>09/11/2015</a:t>
             </a:fld>
             <a:endParaRPr lang="fr-FR"/>
           </a:p>
@@ -4387,7 +4386,7 @@
           <a:p>
             <a:fld id="{6B66237F-26FC-48D6-ABF0-4BFD7085687A}" type="datetimeFigureOut">
               <a:rPr lang="fr-FR" smtClean="0"/>
-              <a:t>05/11/2015</a:t>
+              <a:t>09/11/2015</a:t>
             </a:fld>
             <a:endParaRPr lang="fr-FR"/>
           </a:p>
@@ -4754,7 +4753,7 @@
           <a:p>
             <a:fld id="{6B66237F-26FC-48D6-ABF0-4BFD7085687A}" type="datetimeFigureOut">
               <a:rPr lang="fr-FR" smtClean="0"/>
-              <a:t>05/11/2015</a:t>
+              <a:t>09/11/2015</a:t>
             </a:fld>
             <a:endParaRPr lang="fr-FR"/>
           </a:p>
@@ -4872,7 +4871,7 @@
           <a:p>
             <a:fld id="{6B66237F-26FC-48D6-ABF0-4BFD7085687A}" type="datetimeFigureOut">
               <a:rPr lang="fr-FR" smtClean="0"/>
-              <a:t>05/11/2015</a:t>
+              <a:t>09/11/2015</a:t>
             </a:fld>
             <a:endParaRPr lang="fr-FR"/>
           </a:p>
@@ -4967,7 +4966,7 @@
           <a:p>
             <a:fld id="{6B66237F-26FC-48D6-ABF0-4BFD7085687A}" type="datetimeFigureOut">
               <a:rPr lang="fr-FR" smtClean="0"/>
-              <a:t>05/11/2015</a:t>
+              <a:t>09/11/2015</a:t>
             </a:fld>
             <a:endParaRPr lang="fr-FR"/>
           </a:p>
@@ -5244,7 +5243,7 @@
           <a:p>
             <a:fld id="{6B66237F-26FC-48D6-ABF0-4BFD7085687A}" type="datetimeFigureOut">
               <a:rPr lang="fr-FR" smtClean="0"/>
-              <a:t>05/11/2015</a:t>
+              <a:t>09/11/2015</a:t>
             </a:fld>
             <a:endParaRPr lang="fr-FR"/>
           </a:p>
@@ -5497,7 +5496,7 @@
           <a:p>
             <a:fld id="{6B66237F-26FC-48D6-ABF0-4BFD7085687A}" type="datetimeFigureOut">
               <a:rPr lang="fr-FR" smtClean="0"/>
-              <a:t>05/11/2015</a:t>
+              <a:t>09/11/2015</a:t>
             </a:fld>
             <a:endParaRPr lang="fr-FR"/>
           </a:p>
@@ -5710,7 +5709,7 @@
           <a:p>
             <a:fld id="{6B66237F-26FC-48D6-ABF0-4BFD7085687A}" type="datetimeFigureOut">
               <a:rPr lang="fr-FR" smtClean="0"/>
-              <a:t>05/11/2015</a:t>
+              <a:t>09/11/2015</a:t>
             </a:fld>
             <a:endParaRPr lang="fr-FR"/>
           </a:p>
@@ -6156,6 +6155,45 @@
           </a:extLst>
         </p:spPr>
       </p:pic>
+      <p:pic>
+        <p:nvPicPr>
+          <p:cNvPr id="2" name="Picture 2" descr="Afficher l'image d'origine"/>
+          <p:cNvPicPr>
+            <a:picLocks noChangeAspect="1" noChangeArrowheads="1"/>
+          </p:cNvPicPr>
+          <p:nvPr/>
+        </p:nvPicPr>
+        <p:blipFill rotWithShape="1">
+          <a:blip r:embed="rId3">
+            <a:extLst>
+              <a:ext uri="{28A0092B-C50C-407E-A947-70E740481C1C}">
+                <a14:useLocalDpi xmlns:a14="http://schemas.microsoft.com/office/drawing/2010/main" val="0"/>
+              </a:ext>
+            </a:extLst>
+          </a:blip>
+          <a:srcRect t="3334" b="22834"/>
+          <a:stretch/>
+        </p:blipFill>
+        <p:spPr bwMode="auto">
+          <a:xfrm>
+            <a:off x="6359525" y="1479550"/>
+            <a:ext cx="2667000" cy="2813050"/>
+          </a:xfrm>
+          <a:prstGeom prst="rect">
+            <a:avLst/>
+          </a:prstGeom>
+          <a:noFill/>
+          <a:extLst>
+            <a:ext uri="{909E8E84-426E-40DD-AFC4-6F175D3DCCD1}">
+              <a14:hiddenFill xmlns:a14="http://schemas.microsoft.com/office/drawing/2010/main">
+                <a:solidFill>
+                  <a:srgbClr val="FFFFFF"/>
+                </a:solidFill>
+              </a14:hiddenFill>
+            </a:ext>
+          </a:extLst>
+        </p:spPr>
+      </p:pic>
     </p:spTree>
     <p:extLst>
       <p:ext uri="{BB962C8B-B14F-4D97-AF65-F5344CB8AC3E}">
@@ -6292,15 +6330,7 @@
                   <a:schemeClr val="bg1"/>
                 </a:solidFill>
               </a:rPr>
-              <a:t>Symfony2 </a:t>
-            </a:r>
-            <a:r>
-              <a:rPr lang="fr-FR" sz="2000" b="1" dirty="0" smtClean="0">
-                <a:solidFill>
-                  <a:schemeClr val="bg1"/>
-                </a:solidFill>
-              </a:rPr>
-              <a:t> </a:t>
+              <a:t>Symfony2  </a:t>
             </a:r>
             <a:r>
               <a:rPr lang="fr-FR" sz="2000" b="1" dirty="0" err="1" smtClean="0">
@@ -6339,1855 +6369,6 @@
 </file>
 
 <file path=ppt/slides/slide3.xml><?xml version="1.0" encoding="utf-8"?>
-<p:sld xmlns:a="http://schemas.openxmlformats.org/drawingml/2006/main" xmlns:r="http://schemas.openxmlformats.org/officeDocument/2006/relationships" xmlns:p="http://schemas.openxmlformats.org/presentationml/2006/main">
-  <p:cSld>
-    <p:spTree>
-      <p:nvGrpSpPr>
-        <p:cNvPr id="1" name=""/>
-        <p:cNvGrpSpPr/>
-        <p:nvPr/>
-      </p:nvGrpSpPr>
-      <p:grpSpPr>
-        <a:xfrm>
-          <a:off x="0" y="0"/>
-          <a:ext cx="0" cy="0"/>
-          <a:chOff x="0" y="0"/>
-          <a:chExt cx="0" cy="0"/>
-        </a:xfrm>
-      </p:grpSpPr>
-      <p:pic>
-        <p:nvPicPr>
-          <p:cNvPr id="4" name="Picture 2" descr="ordinateur-moniteur-ecran-icone-8084-128"/>
-          <p:cNvPicPr>
-            <a:picLocks noChangeAspect="1" noChangeArrowheads="1"/>
-          </p:cNvPicPr>
-          <p:nvPr/>
-        </p:nvPicPr>
-        <p:blipFill>
-          <a:blip r:embed="rId2">
-            <a:extLst>
-              <a:ext uri="{28A0092B-C50C-407E-A947-70E740481C1C}">
-                <a14:useLocalDpi xmlns:a14="http://schemas.microsoft.com/office/drawing/2010/main" val="0"/>
-              </a:ext>
-            </a:extLst>
-          </a:blip>
-          <a:srcRect/>
-          <a:stretch>
-            <a:fillRect/>
-          </a:stretch>
-        </p:blipFill>
-        <p:spPr bwMode="auto">
-          <a:xfrm>
-            <a:off x="1076325" y="332656"/>
-            <a:ext cx="714376" cy="714376"/>
-          </a:xfrm>
-          <a:prstGeom prst="rect">
-            <a:avLst/>
-          </a:prstGeom>
-          <a:noFill/>
-          <a:extLst>
-            <a:ext uri="{909E8E84-426E-40DD-AFC4-6F175D3DCCD1}">
-              <a14:hiddenFill xmlns:a14="http://schemas.microsoft.com/office/drawing/2010/main">
-                <a:solidFill>
-                  <a:srgbClr val="FFFFFF"/>
-                </a:solidFill>
-              </a14:hiddenFill>
-            </a:ext>
-          </a:extLst>
-        </p:spPr>
-      </p:pic>
-      <p:sp>
-        <p:nvSpPr>
-          <p:cNvPr id="5" name="Rectangle à coins arrondis 291"/>
-          <p:cNvSpPr>
-            <a:spLocks noChangeArrowheads="1"/>
-          </p:cNvSpPr>
-          <p:nvPr/>
-        </p:nvSpPr>
-        <p:spPr bwMode="auto">
-          <a:xfrm>
-            <a:off x="485774" y="1529408"/>
-            <a:ext cx="1820864" cy="419050"/>
-          </a:xfrm>
-          <a:prstGeom prst="roundRect">
-            <a:avLst>
-              <a:gd name="adj" fmla="val 43111"/>
-            </a:avLst>
-          </a:prstGeom>
-          <a:solidFill>
-            <a:srgbClr val="FFC000"/>
-          </a:solidFill>
-          <a:ln>
-            <a:noFill/>
-          </a:ln>
-          <a:effectLst>
-            <a:outerShdw dist="38100" dir="2700000" algn="tl" rotWithShape="0">
-              <a:srgbClr val="000000">
-                <a:alpha val="39999"/>
-              </a:srgbClr>
-            </a:outerShdw>
-          </a:effectLst>
-          <a:extLst>
-            <a:ext uri="{91240B29-F687-4F45-9708-019B960494DF}">
-              <a14:hiddenLine xmlns:a14="http://schemas.microsoft.com/office/drawing/2010/main" w="9525">
-                <a:solidFill>
-                  <a:srgbClr val="000000"/>
-                </a:solidFill>
-                <a:round/>
-                <a:headEnd/>
-                <a:tailEnd/>
-              </a14:hiddenLine>
-            </a:ext>
-          </a:extLst>
-        </p:spPr>
-        <p:txBody>
-          <a:bodyPr vert="horz" wrap="square" lIns="91440" tIns="45720" rIns="91440" bIns="45720" numCol="1" anchor="ctr" anchorCtr="0" compatLnSpc="1">
-            <a:prstTxWarp prst="textNoShape">
-              <a:avLst/>
-            </a:prstTxWarp>
-          </a:bodyPr>
-          <a:lstStyle/>
-          <a:p>
-            <a:pPr marL="0" marR="0" lvl="0" indent="0" algn="ctr" defTabSz="914400" rtl="0" eaLnBrk="1" fontAlgn="base" latinLnBrk="0" hangingPunct="1">
-              <a:lnSpc>
-                <a:spcPct val="100000"/>
-              </a:lnSpc>
-              <a:spcBef>
-                <a:spcPct val="0"/>
-              </a:spcBef>
-              <a:spcAft>
-                <a:spcPct val="0"/>
-              </a:spcAft>
-              <a:buClrTx/>
-              <a:buSzTx/>
-              <a:buFontTx/>
-              <a:buNone/>
-              <a:tabLst/>
-            </a:pPr>
-            <a:r>
-              <a:rPr kumimoji="0" lang="fr-FR" altLang="fr-FR" sz="1400" b="0" i="0" u="none" strike="noStrike" cap="none" normalizeH="0" baseline="0" dirty="0" smtClean="0">
-                <a:ln>
-                  <a:noFill/>
-                </a:ln>
-                <a:solidFill>
-                  <a:schemeClr val="tx1"/>
-                </a:solidFill>
-                <a:effectLst/>
-                <a:latin typeface="Calibri" pitchFamily="34" charset="0"/>
-                <a:ea typeface="Calibri" pitchFamily="34" charset="0"/>
-                <a:cs typeface="Times New Roman" pitchFamily="18" charset="0"/>
-              </a:rPr>
-              <a:t>Contrôleur frontal</a:t>
-            </a:r>
-            <a:endParaRPr kumimoji="0" lang="fr-FR" altLang="fr-FR" sz="1800" b="0" i="0" u="none" strike="noStrike" cap="none" normalizeH="0" baseline="0" dirty="0" smtClean="0">
-              <a:ln>
-                <a:noFill/>
-              </a:ln>
-              <a:solidFill>
-                <a:schemeClr val="tx1"/>
-              </a:solidFill>
-              <a:effectLst/>
-              <a:latin typeface="Arial" pitchFamily="34" charset="0"/>
-              <a:cs typeface="Arial" pitchFamily="34" charset="0"/>
-            </a:endParaRPr>
-          </a:p>
-        </p:txBody>
-      </p:sp>
-      <p:sp>
-        <p:nvSpPr>
-          <p:cNvPr id="6" name="Rectangle 293"/>
-          <p:cNvSpPr>
-            <a:spLocks noChangeArrowheads="1"/>
-          </p:cNvSpPr>
-          <p:nvPr/>
-        </p:nvSpPr>
-        <p:spPr bwMode="auto">
-          <a:xfrm>
-            <a:off x="496887" y="2321497"/>
-            <a:ext cx="1800226" cy="677788"/>
-          </a:xfrm>
-          <a:prstGeom prst="rect">
-            <a:avLst/>
-          </a:prstGeom>
-          <a:solidFill>
-            <a:srgbClr val="548DD4"/>
-          </a:solidFill>
-          <a:ln>
-            <a:noFill/>
-          </a:ln>
-          <a:effectLst>
-            <a:outerShdw dist="38100" dir="2700000" algn="tl" rotWithShape="0">
-              <a:srgbClr val="000000">
-                <a:alpha val="39999"/>
-              </a:srgbClr>
-            </a:outerShdw>
-          </a:effectLst>
-          <a:extLst>
-            <a:ext uri="{91240B29-F687-4F45-9708-019B960494DF}">
-              <a14:hiddenLine xmlns:a14="http://schemas.microsoft.com/office/drawing/2010/main" w="25400">
-                <a:solidFill>
-                  <a:srgbClr val="000000"/>
-                </a:solidFill>
-                <a:miter lim="800000"/>
-                <a:headEnd/>
-                <a:tailEnd/>
-              </a14:hiddenLine>
-            </a:ext>
-          </a:extLst>
-        </p:spPr>
-        <p:txBody>
-          <a:bodyPr vert="horz" wrap="square" lIns="91440" tIns="45720" rIns="91440" bIns="45720" numCol="1" anchor="ctr" anchorCtr="0" compatLnSpc="1">
-            <a:prstTxWarp prst="textNoShape">
-              <a:avLst/>
-            </a:prstTxWarp>
-          </a:bodyPr>
-          <a:lstStyle/>
-          <a:p>
-            <a:pPr marL="0" marR="0" lvl="0" indent="0" algn="ctr" defTabSz="914400" rtl="0" eaLnBrk="1" fontAlgn="base" latinLnBrk="0" hangingPunct="1">
-              <a:lnSpc>
-                <a:spcPct val="100000"/>
-              </a:lnSpc>
-              <a:spcBef>
-                <a:spcPct val="0"/>
-              </a:spcBef>
-              <a:spcAft>
-                <a:spcPct val="0"/>
-              </a:spcAft>
-              <a:buClrTx/>
-              <a:buSzTx/>
-              <a:buFontTx/>
-              <a:buNone/>
-              <a:tabLst/>
-            </a:pPr>
-            <a:r>
-              <a:rPr kumimoji="0" lang="fr-FR" altLang="fr-FR" sz="1400" b="0" i="0" u="none" strike="noStrike" cap="none" normalizeH="0" baseline="0" dirty="0" smtClean="0">
-                <a:ln>
-                  <a:noFill/>
-                </a:ln>
-                <a:solidFill>
-                  <a:schemeClr val="tx1"/>
-                </a:solidFill>
-                <a:effectLst/>
-                <a:latin typeface="Calibri" pitchFamily="34" charset="0"/>
-                <a:ea typeface="Calibri" pitchFamily="34" charset="0"/>
-                <a:cs typeface="Times New Roman" pitchFamily="18" charset="0"/>
-              </a:rPr>
-              <a:t>Noyau Symfony2</a:t>
-            </a:r>
-            <a:endParaRPr kumimoji="0" lang="fr-FR" altLang="fr-FR" sz="1800" b="0" i="0" u="none" strike="noStrike" cap="none" normalizeH="0" baseline="0" dirty="0" smtClean="0">
-              <a:ln>
-                <a:noFill/>
-              </a:ln>
-              <a:solidFill>
-                <a:schemeClr val="tx1"/>
-              </a:solidFill>
-              <a:effectLst/>
-              <a:latin typeface="Arial" pitchFamily="34" charset="0"/>
-              <a:cs typeface="Arial" pitchFamily="34" charset="0"/>
-            </a:endParaRPr>
-          </a:p>
-        </p:txBody>
-      </p:sp>
-      <p:sp>
-        <p:nvSpPr>
-          <p:cNvPr id="7" name="Rectangle 292"/>
-          <p:cNvSpPr>
-            <a:spLocks noChangeArrowheads="1"/>
-          </p:cNvSpPr>
-          <p:nvPr/>
-        </p:nvSpPr>
-        <p:spPr bwMode="auto">
-          <a:xfrm>
-            <a:off x="496887" y="3329608"/>
-            <a:ext cx="1800226" cy="1906915"/>
-          </a:xfrm>
-          <a:prstGeom prst="rect">
-            <a:avLst/>
-          </a:prstGeom>
-          <a:solidFill>
-            <a:srgbClr val="C2D69B"/>
-          </a:solidFill>
-          <a:ln>
-            <a:noFill/>
-          </a:ln>
-          <a:effectLst>
-            <a:outerShdw dist="38100" dir="2700000" algn="tl" rotWithShape="0">
-              <a:srgbClr val="000000">
-                <a:alpha val="39999"/>
-              </a:srgbClr>
-            </a:outerShdw>
-          </a:effectLst>
-          <a:extLst>
-            <a:ext uri="{91240B29-F687-4F45-9708-019B960494DF}">
-              <a14:hiddenLine xmlns:a14="http://schemas.microsoft.com/office/drawing/2010/main" w="9525">
-                <a:solidFill>
-                  <a:srgbClr val="000000"/>
-                </a:solidFill>
-                <a:miter lim="800000"/>
-                <a:headEnd/>
-                <a:tailEnd/>
-              </a14:hiddenLine>
-            </a:ext>
-          </a:extLst>
-        </p:spPr>
-        <p:txBody>
-          <a:bodyPr vert="horz" wrap="square" lIns="91440" tIns="45720" rIns="91440" bIns="45720" numCol="1" anchor="ctr" anchorCtr="0" compatLnSpc="1">
-            <a:prstTxWarp prst="textNoShape">
-              <a:avLst/>
-            </a:prstTxWarp>
-          </a:bodyPr>
-          <a:lstStyle/>
-          <a:p>
-            <a:pPr marL="0" marR="0" lvl="0" indent="0" algn="ctr" defTabSz="914400" rtl="0" eaLnBrk="1" fontAlgn="base" latinLnBrk="0" hangingPunct="1">
-              <a:lnSpc>
-                <a:spcPct val="100000"/>
-              </a:lnSpc>
-              <a:spcBef>
-                <a:spcPct val="0"/>
-              </a:spcBef>
-              <a:spcAft>
-                <a:spcPct val="0"/>
-              </a:spcAft>
-              <a:buClrTx/>
-              <a:buSzTx/>
-              <a:buFontTx/>
-              <a:buNone/>
-              <a:tabLst/>
-            </a:pPr>
-            <a:r>
-              <a:rPr kumimoji="0" lang="fr-FR" altLang="fr-FR" sz="1400" b="0" i="0" u="none" strike="noStrike" cap="none" normalizeH="0" baseline="0" dirty="0" smtClean="0">
-                <a:ln>
-                  <a:noFill/>
-                </a:ln>
-                <a:effectLst/>
-                <a:latin typeface="Calibri" pitchFamily="34" charset="0"/>
-                <a:ea typeface="Calibri" pitchFamily="34" charset="0"/>
-                <a:cs typeface="Times New Roman" pitchFamily="18" charset="0"/>
-              </a:rPr>
-              <a:t>Contrôleur</a:t>
-            </a:r>
-            <a:br>
-              <a:rPr kumimoji="0" lang="fr-FR" altLang="fr-FR" sz="1400" b="0" i="0" u="none" strike="noStrike" cap="none" normalizeH="0" baseline="0" dirty="0" smtClean="0">
-                <a:ln>
-                  <a:noFill/>
-                </a:ln>
-                <a:effectLst/>
-                <a:latin typeface="Calibri" pitchFamily="34" charset="0"/>
-                <a:ea typeface="Calibri" pitchFamily="34" charset="0"/>
-                <a:cs typeface="Times New Roman" pitchFamily="18" charset="0"/>
-              </a:rPr>
-            </a:br>
-            <a:r>
-              <a:rPr kumimoji="0" lang="fr-FR" altLang="fr-FR" sz="1400" b="0" i="0" u="none" strike="noStrike" cap="none" normalizeH="0" baseline="0" dirty="0" smtClean="0">
-                <a:ln>
-                  <a:noFill/>
-                </a:ln>
-                <a:effectLst/>
-                <a:latin typeface="Calibri" pitchFamily="34" charset="0"/>
-                <a:ea typeface="Calibri" pitchFamily="34" charset="0"/>
-                <a:cs typeface="Times New Roman" pitchFamily="18" charset="0"/>
-              </a:rPr>
-              <a:t>EfStage</a:t>
-            </a:r>
-            <a:endParaRPr kumimoji="0" lang="fr-FR" altLang="fr-FR" sz="1800" b="0" i="0" u="none" strike="noStrike" cap="none" normalizeH="0" baseline="0" dirty="0" smtClean="0">
-              <a:ln>
-                <a:noFill/>
-              </a:ln>
-              <a:effectLst/>
-              <a:latin typeface="Arial" pitchFamily="34" charset="0"/>
-              <a:cs typeface="Arial" pitchFamily="34" charset="0"/>
-            </a:endParaRPr>
-          </a:p>
-        </p:txBody>
-      </p:sp>
-      <p:sp>
-        <p:nvSpPr>
-          <p:cNvPr id="8" name="Rectangle 295"/>
-          <p:cNvSpPr>
-            <a:spLocks noChangeArrowheads="1"/>
-          </p:cNvSpPr>
-          <p:nvPr/>
-        </p:nvSpPr>
-        <p:spPr bwMode="auto">
-          <a:xfrm>
-            <a:off x="3877357" y="3365921"/>
-            <a:ext cx="1594755" cy="797413"/>
-          </a:xfrm>
-          <a:prstGeom prst="rect">
-            <a:avLst/>
-          </a:prstGeom>
-          <a:solidFill>
-            <a:srgbClr val="C2D69B"/>
-          </a:solidFill>
-          <a:ln>
-            <a:noFill/>
-          </a:ln>
-          <a:effectLst>
-            <a:outerShdw dist="38100" dir="2700000" algn="tl" rotWithShape="0">
-              <a:srgbClr val="000000">
-                <a:alpha val="39999"/>
-              </a:srgbClr>
-            </a:outerShdw>
-          </a:effectLst>
-          <a:extLst>
-            <a:ext uri="{91240B29-F687-4F45-9708-019B960494DF}">
-              <a14:hiddenLine xmlns:a14="http://schemas.microsoft.com/office/drawing/2010/main" w="9525">
-                <a:solidFill>
-                  <a:srgbClr val="000000"/>
-                </a:solidFill>
-                <a:miter lim="800000"/>
-                <a:headEnd/>
-                <a:tailEnd/>
-              </a14:hiddenLine>
-            </a:ext>
-          </a:extLst>
-        </p:spPr>
-        <p:txBody>
-          <a:bodyPr vert="horz" wrap="square" lIns="91440" tIns="45720" rIns="91440" bIns="45720" numCol="1" anchor="ctr" anchorCtr="0" compatLnSpc="1">
-            <a:prstTxWarp prst="textNoShape">
-              <a:avLst/>
-            </a:prstTxWarp>
-          </a:bodyPr>
-          <a:lstStyle/>
-          <a:p>
-            <a:pPr marL="0" marR="0" lvl="0" indent="0" algn="ctr" defTabSz="914400" rtl="0" eaLnBrk="1" fontAlgn="base" latinLnBrk="0" hangingPunct="1">
-              <a:lnSpc>
-                <a:spcPct val="100000"/>
-              </a:lnSpc>
-              <a:spcBef>
-                <a:spcPct val="0"/>
-              </a:spcBef>
-              <a:spcAft>
-                <a:spcPct val="0"/>
-              </a:spcAft>
-              <a:buClrTx/>
-              <a:buSzTx/>
-              <a:buFontTx/>
-              <a:buNone/>
-              <a:tabLst/>
-            </a:pPr>
-            <a:r>
-              <a:rPr kumimoji="0" lang="fr-FR" altLang="fr-FR" sz="1400" b="0" i="0" u="none" strike="noStrike" cap="none" normalizeH="0" baseline="0" dirty="0" smtClean="0">
-                <a:ln>
-                  <a:noFill/>
-                </a:ln>
-                <a:solidFill>
-                  <a:schemeClr val="tx1"/>
-                </a:solidFill>
-                <a:effectLst/>
-                <a:latin typeface="Calibri" pitchFamily="34" charset="0"/>
-                <a:ea typeface="Calibri" pitchFamily="34" charset="0"/>
-                <a:cs typeface="Times New Roman" pitchFamily="18" charset="0"/>
-              </a:rPr>
-              <a:t>Modèle Stage</a:t>
-            </a:r>
-            <a:endParaRPr kumimoji="0" lang="fr-FR" altLang="fr-FR" sz="1800" b="0" i="0" u="none" strike="noStrike" cap="none" normalizeH="0" baseline="0" dirty="0" smtClean="0">
-              <a:ln>
-                <a:noFill/>
-              </a:ln>
-              <a:solidFill>
-                <a:schemeClr val="tx1"/>
-              </a:solidFill>
-              <a:effectLst/>
-              <a:latin typeface="Arial" pitchFamily="34" charset="0"/>
-              <a:cs typeface="Arial" pitchFamily="34" charset="0"/>
-            </a:endParaRPr>
-          </a:p>
-        </p:txBody>
-      </p:sp>
-      <p:sp>
-        <p:nvSpPr>
-          <p:cNvPr id="9" name="Rectangle 294"/>
-          <p:cNvSpPr>
-            <a:spLocks noChangeArrowheads="1"/>
-          </p:cNvSpPr>
-          <p:nvPr/>
-        </p:nvSpPr>
-        <p:spPr bwMode="auto">
-          <a:xfrm>
-            <a:off x="3877357" y="4409728"/>
-            <a:ext cx="1594756" cy="832599"/>
-          </a:xfrm>
-          <a:prstGeom prst="rect">
-            <a:avLst/>
-          </a:prstGeom>
-          <a:solidFill>
-            <a:srgbClr val="C2D69B"/>
-          </a:solidFill>
-          <a:ln>
-            <a:noFill/>
-          </a:ln>
-          <a:effectLst>
-            <a:outerShdw dist="38100" dir="2700000" algn="tl" rotWithShape="0">
-              <a:srgbClr val="000000">
-                <a:alpha val="39999"/>
-              </a:srgbClr>
-            </a:outerShdw>
-          </a:effectLst>
-          <a:extLst>
-            <a:ext uri="{91240B29-F687-4F45-9708-019B960494DF}">
-              <a14:hiddenLine xmlns:a14="http://schemas.microsoft.com/office/drawing/2010/main" w="9525">
-                <a:solidFill>
-                  <a:srgbClr val="000000"/>
-                </a:solidFill>
-                <a:miter lim="800000"/>
-                <a:headEnd/>
-                <a:tailEnd/>
-              </a14:hiddenLine>
-            </a:ext>
-          </a:extLst>
-        </p:spPr>
-        <p:txBody>
-          <a:bodyPr vert="horz" wrap="square" lIns="91440" tIns="45720" rIns="91440" bIns="45720" numCol="1" anchor="ctr" anchorCtr="0" compatLnSpc="1">
-            <a:prstTxWarp prst="textNoShape">
-              <a:avLst/>
-            </a:prstTxWarp>
-          </a:bodyPr>
-          <a:lstStyle/>
-          <a:p>
-            <a:pPr marL="0" marR="0" lvl="0" indent="0" algn="ctr" defTabSz="914400" rtl="0" eaLnBrk="1" fontAlgn="base" latinLnBrk="0" hangingPunct="1">
-              <a:lnSpc>
-                <a:spcPct val="100000"/>
-              </a:lnSpc>
-              <a:spcBef>
-                <a:spcPct val="0"/>
-              </a:spcBef>
-              <a:spcAft>
-                <a:spcPct val="0"/>
-              </a:spcAft>
-              <a:buClrTx/>
-              <a:buSzTx/>
-              <a:buFontTx/>
-              <a:buNone/>
-              <a:tabLst/>
-            </a:pPr>
-            <a:r>
-              <a:rPr kumimoji="0" lang="fr-FR" altLang="fr-FR" sz="1400" b="0" i="0" u="none" strike="noStrike" cap="none" normalizeH="0" baseline="0" dirty="0" smtClean="0">
-                <a:ln>
-                  <a:noFill/>
-                </a:ln>
-                <a:solidFill>
-                  <a:schemeClr val="tx1"/>
-                </a:solidFill>
-                <a:effectLst/>
-                <a:latin typeface="Calibri" pitchFamily="34" charset="0"/>
-                <a:ea typeface="Calibri" pitchFamily="34" charset="0"/>
-                <a:cs typeface="Times New Roman" pitchFamily="18" charset="0"/>
-              </a:rPr>
-              <a:t>Vue</a:t>
-            </a:r>
-            <a:br>
-              <a:rPr kumimoji="0" lang="fr-FR" altLang="fr-FR" sz="1400" b="0" i="0" u="none" strike="noStrike" cap="none" normalizeH="0" baseline="0" dirty="0" smtClean="0">
-                <a:ln>
-                  <a:noFill/>
-                </a:ln>
-                <a:solidFill>
-                  <a:schemeClr val="tx1"/>
-                </a:solidFill>
-                <a:effectLst/>
-                <a:latin typeface="Calibri" pitchFamily="34" charset="0"/>
-                <a:ea typeface="Calibri" pitchFamily="34" charset="0"/>
-                <a:cs typeface="Times New Roman" pitchFamily="18" charset="0"/>
-              </a:rPr>
-            </a:br>
-            <a:r>
-              <a:rPr kumimoji="0" lang="fr-FR" altLang="fr-FR" sz="1400" b="0" i="0" u="none" strike="noStrike" cap="none" normalizeH="0" baseline="0" dirty="0" err="1" smtClean="0">
-                <a:ln>
-                  <a:noFill/>
-                </a:ln>
-                <a:solidFill>
-                  <a:schemeClr val="tx1"/>
-                </a:solidFill>
-                <a:effectLst/>
-                <a:latin typeface="Calibri" pitchFamily="34" charset="0"/>
-                <a:ea typeface="Calibri" pitchFamily="34" charset="0"/>
-                <a:cs typeface="Times New Roman" pitchFamily="18" charset="0"/>
-              </a:rPr>
-              <a:t>VoirStage</a:t>
-            </a:r>
-            <a:endParaRPr kumimoji="0" lang="fr-FR" altLang="fr-FR" sz="1800" b="0" i="0" u="none" strike="noStrike" cap="none" normalizeH="0" baseline="0" dirty="0" smtClean="0">
-              <a:ln>
-                <a:noFill/>
-              </a:ln>
-              <a:solidFill>
-                <a:schemeClr val="tx1"/>
-              </a:solidFill>
-              <a:effectLst/>
-              <a:latin typeface="Arial" pitchFamily="34" charset="0"/>
-              <a:cs typeface="Arial" pitchFamily="34" charset="0"/>
-            </a:endParaRPr>
-          </a:p>
-        </p:txBody>
-      </p:sp>
-      <p:cxnSp>
-        <p:nvCxnSpPr>
-          <p:cNvPr id="10" name="Connecteur droit avec flèche 9"/>
-          <p:cNvCxnSpPr/>
-          <p:nvPr/>
-        </p:nvCxnSpPr>
-        <p:spPr>
-          <a:xfrm flipH="1">
-            <a:off x="1376362" y="1047032"/>
-            <a:ext cx="1" cy="410368"/>
-          </a:xfrm>
-          <a:prstGeom prst="straightConnector1">
-            <a:avLst/>
-          </a:prstGeom>
-          <a:ln w="19050">
-            <a:tailEnd type="arrow"/>
-          </a:ln>
-        </p:spPr>
-        <p:style>
-          <a:lnRef idx="1">
-            <a:schemeClr val="dk1"/>
-          </a:lnRef>
-          <a:fillRef idx="0">
-            <a:schemeClr val="dk1"/>
-          </a:fillRef>
-          <a:effectRef idx="0">
-            <a:schemeClr val="dk1"/>
-          </a:effectRef>
-          <a:fontRef idx="minor">
-            <a:schemeClr val="tx1"/>
-          </a:fontRef>
-        </p:style>
-      </p:cxnSp>
-      <p:cxnSp>
-        <p:nvCxnSpPr>
-          <p:cNvPr id="11" name="Connecteur droit avec flèche 10"/>
-          <p:cNvCxnSpPr>
-            <a:stCxn id="5" idx="2"/>
-            <a:endCxn id="6" idx="0"/>
-          </p:cNvCxnSpPr>
-          <p:nvPr/>
-        </p:nvCxnSpPr>
-        <p:spPr>
-          <a:xfrm>
-            <a:off x="1396206" y="1948458"/>
-            <a:ext cx="794" cy="373039"/>
-          </a:xfrm>
-          <a:prstGeom prst="straightConnector1">
-            <a:avLst/>
-          </a:prstGeom>
-          <a:ln w="19050">
-            <a:tailEnd type="arrow"/>
-          </a:ln>
-        </p:spPr>
-        <p:style>
-          <a:lnRef idx="1">
-            <a:schemeClr val="dk1"/>
-          </a:lnRef>
-          <a:fillRef idx="0">
-            <a:schemeClr val="dk1"/>
-          </a:fillRef>
-          <a:effectRef idx="0">
-            <a:schemeClr val="dk1"/>
-          </a:effectRef>
-          <a:fontRef idx="minor">
-            <a:schemeClr val="tx1"/>
-          </a:fontRef>
-        </p:style>
-      </p:cxnSp>
-      <p:cxnSp>
-        <p:nvCxnSpPr>
-          <p:cNvPr id="12" name="Connecteur droit avec flèche 11"/>
-          <p:cNvCxnSpPr>
-            <a:stCxn id="6" idx="2"/>
-            <a:endCxn id="7" idx="0"/>
-          </p:cNvCxnSpPr>
-          <p:nvPr/>
-        </p:nvCxnSpPr>
-        <p:spPr>
-          <a:xfrm>
-            <a:off x="1397000" y="2999285"/>
-            <a:ext cx="0" cy="330323"/>
-          </a:xfrm>
-          <a:prstGeom prst="straightConnector1">
-            <a:avLst/>
-          </a:prstGeom>
-          <a:ln w="19050">
-            <a:tailEnd type="arrow"/>
-          </a:ln>
-        </p:spPr>
-        <p:style>
-          <a:lnRef idx="1">
-            <a:schemeClr val="dk1"/>
-          </a:lnRef>
-          <a:fillRef idx="0">
-            <a:schemeClr val="dk1"/>
-          </a:fillRef>
-          <a:effectRef idx="0">
-            <a:schemeClr val="dk1"/>
-          </a:effectRef>
-          <a:fontRef idx="minor">
-            <a:schemeClr val="tx1"/>
-          </a:fontRef>
-        </p:style>
-      </p:cxnSp>
-      <p:cxnSp>
-        <p:nvCxnSpPr>
-          <p:cNvPr id="13" name="Connecteur droit avec flèche 12"/>
-          <p:cNvCxnSpPr>
-            <a:stCxn id="7" idx="2"/>
-            <a:endCxn id="27" idx="0"/>
-          </p:cNvCxnSpPr>
-          <p:nvPr/>
-        </p:nvCxnSpPr>
-        <p:spPr>
-          <a:xfrm>
-            <a:off x="1397000" y="5236523"/>
-            <a:ext cx="0" cy="685373"/>
-          </a:xfrm>
-          <a:prstGeom prst="straightConnector1">
-            <a:avLst/>
-          </a:prstGeom>
-          <a:ln w="19050">
-            <a:tailEnd type="arrow"/>
-          </a:ln>
-        </p:spPr>
-        <p:style>
-          <a:lnRef idx="1">
-            <a:schemeClr val="dk1"/>
-          </a:lnRef>
-          <a:fillRef idx="0">
-            <a:schemeClr val="dk1"/>
-          </a:fillRef>
-          <a:effectRef idx="0">
-            <a:schemeClr val="dk1"/>
-          </a:effectRef>
-          <a:fontRef idx="minor">
-            <a:schemeClr val="tx1"/>
-          </a:fontRef>
-        </p:style>
-      </p:cxnSp>
-      <p:cxnSp>
-        <p:nvCxnSpPr>
-          <p:cNvPr id="14" name="Connecteur droit avec flèche 13"/>
-          <p:cNvCxnSpPr/>
-          <p:nvPr/>
-        </p:nvCxnSpPr>
-        <p:spPr>
-          <a:xfrm>
-            <a:off x="2297113" y="2507033"/>
-            <a:ext cx="1580244" cy="0"/>
-          </a:xfrm>
-          <a:prstGeom prst="straightConnector1">
-            <a:avLst/>
-          </a:prstGeom>
-          <a:ln w="19050">
-            <a:tailEnd type="arrow"/>
-          </a:ln>
-        </p:spPr>
-        <p:style>
-          <a:lnRef idx="1">
-            <a:schemeClr val="dk1"/>
-          </a:lnRef>
-          <a:fillRef idx="0">
-            <a:schemeClr val="dk1"/>
-          </a:fillRef>
-          <a:effectRef idx="0">
-            <a:schemeClr val="dk1"/>
-          </a:effectRef>
-          <a:fontRef idx="minor">
-            <a:schemeClr val="tx1"/>
-          </a:fontRef>
-        </p:style>
-      </p:cxnSp>
-      <p:cxnSp>
-        <p:nvCxnSpPr>
-          <p:cNvPr id="15" name="Connecteur droit avec flèche 14"/>
-          <p:cNvCxnSpPr/>
-          <p:nvPr/>
-        </p:nvCxnSpPr>
-        <p:spPr>
-          <a:xfrm>
-            <a:off x="2297113" y="3634532"/>
-            <a:ext cx="1580244" cy="0"/>
-          </a:xfrm>
-          <a:prstGeom prst="straightConnector1">
-            <a:avLst/>
-          </a:prstGeom>
-          <a:ln w="19050">
-            <a:tailEnd type="arrow"/>
-          </a:ln>
-        </p:spPr>
-        <p:style>
-          <a:lnRef idx="1">
-            <a:schemeClr val="dk1"/>
-          </a:lnRef>
-          <a:fillRef idx="0">
-            <a:schemeClr val="dk1"/>
-          </a:fillRef>
-          <a:effectRef idx="0">
-            <a:schemeClr val="dk1"/>
-          </a:effectRef>
-          <a:fontRef idx="minor">
-            <a:schemeClr val="tx1"/>
-          </a:fontRef>
-        </p:style>
-      </p:cxnSp>
-      <p:cxnSp>
-        <p:nvCxnSpPr>
-          <p:cNvPr id="16" name="Connecteur droit avec flèche 15"/>
-          <p:cNvCxnSpPr/>
-          <p:nvPr/>
-        </p:nvCxnSpPr>
-        <p:spPr>
-          <a:xfrm>
-            <a:off x="2306638" y="4716810"/>
-            <a:ext cx="1570719" cy="0"/>
-          </a:xfrm>
-          <a:prstGeom prst="straightConnector1">
-            <a:avLst/>
-          </a:prstGeom>
-          <a:ln w="19050">
-            <a:tailEnd type="arrow"/>
-          </a:ln>
-        </p:spPr>
-        <p:style>
-          <a:lnRef idx="1">
-            <a:schemeClr val="dk1"/>
-          </a:lnRef>
-          <a:fillRef idx="0">
-            <a:schemeClr val="dk1"/>
-          </a:fillRef>
-          <a:effectRef idx="0">
-            <a:schemeClr val="dk1"/>
-          </a:effectRef>
-          <a:fontRef idx="minor">
-            <a:schemeClr val="tx1"/>
-          </a:fontRef>
-        </p:style>
-      </p:cxnSp>
-      <p:cxnSp>
-        <p:nvCxnSpPr>
-          <p:cNvPr id="17" name="Connecteur droit avec flèche 16"/>
-          <p:cNvCxnSpPr/>
-          <p:nvPr/>
-        </p:nvCxnSpPr>
-        <p:spPr>
-          <a:xfrm flipH="1">
-            <a:off x="2310483" y="2753544"/>
-            <a:ext cx="1580244" cy="0"/>
-          </a:xfrm>
-          <a:prstGeom prst="straightConnector1">
-            <a:avLst/>
-          </a:prstGeom>
-          <a:ln w="19050">
-            <a:tailEnd type="arrow"/>
-          </a:ln>
-        </p:spPr>
-        <p:style>
-          <a:lnRef idx="1">
-            <a:schemeClr val="dk1"/>
-          </a:lnRef>
-          <a:fillRef idx="0">
-            <a:schemeClr val="dk1"/>
-          </a:fillRef>
-          <a:effectRef idx="0">
-            <a:schemeClr val="dk1"/>
-          </a:effectRef>
-          <a:fontRef idx="minor">
-            <a:schemeClr val="tx1"/>
-          </a:fontRef>
-        </p:style>
-      </p:cxnSp>
-      <p:cxnSp>
-        <p:nvCxnSpPr>
-          <p:cNvPr id="18" name="Connecteur droit avec flèche 17"/>
-          <p:cNvCxnSpPr/>
-          <p:nvPr/>
-        </p:nvCxnSpPr>
-        <p:spPr>
-          <a:xfrm flipH="1">
-            <a:off x="2306639" y="3949174"/>
-            <a:ext cx="1584088" cy="0"/>
-          </a:xfrm>
-          <a:prstGeom prst="straightConnector1">
-            <a:avLst/>
-          </a:prstGeom>
-          <a:ln w="19050">
-            <a:tailEnd type="arrow"/>
-          </a:ln>
-        </p:spPr>
-        <p:style>
-          <a:lnRef idx="1">
-            <a:schemeClr val="dk1"/>
-          </a:lnRef>
-          <a:fillRef idx="0">
-            <a:schemeClr val="dk1"/>
-          </a:fillRef>
-          <a:effectRef idx="0">
-            <a:schemeClr val="dk1"/>
-          </a:effectRef>
-          <a:fontRef idx="minor">
-            <a:schemeClr val="tx1"/>
-          </a:fontRef>
-        </p:style>
-      </p:cxnSp>
-      <p:cxnSp>
-        <p:nvCxnSpPr>
-          <p:cNvPr id="19" name="Connecteur droit avec flèche 18"/>
-          <p:cNvCxnSpPr/>
-          <p:nvPr/>
-        </p:nvCxnSpPr>
-        <p:spPr>
-          <a:xfrm flipH="1">
-            <a:off x="2297114" y="4985792"/>
-            <a:ext cx="1580243" cy="0"/>
-          </a:xfrm>
-          <a:prstGeom prst="straightConnector1">
-            <a:avLst/>
-          </a:prstGeom>
-          <a:ln w="19050">
-            <a:tailEnd type="arrow"/>
-          </a:ln>
-        </p:spPr>
-        <p:style>
-          <a:lnRef idx="1">
-            <a:schemeClr val="dk1"/>
-          </a:lnRef>
-          <a:fillRef idx="0">
-            <a:schemeClr val="dk1"/>
-          </a:fillRef>
-          <a:effectRef idx="0">
-            <a:schemeClr val="dk1"/>
-          </a:effectRef>
-          <a:fontRef idx="minor">
-            <a:schemeClr val="tx1"/>
-          </a:fontRef>
-        </p:style>
-      </p:cxnSp>
-      <p:sp>
-        <p:nvSpPr>
-          <p:cNvPr id="20" name="Zone de texte 2"/>
-          <p:cNvSpPr txBox="1">
-            <a:spLocks noChangeArrowheads="1"/>
-          </p:cNvSpPr>
-          <p:nvPr/>
-        </p:nvSpPr>
-        <p:spPr bwMode="auto">
-          <a:xfrm>
-            <a:off x="1400845" y="1037507"/>
-            <a:ext cx="1438275" cy="533400"/>
-          </a:xfrm>
-          <a:prstGeom prst="rect">
-            <a:avLst/>
-          </a:prstGeom>
-          <a:noFill/>
-          <a:ln>
-            <a:noFill/>
-          </a:ln>
-          <a:extLst>
-            <a:ext uri="{909E8E84-426E-40DD-AFC4-6F175D3DCCD1}">
-              <a14:hiddenFill xmlns:a14="http://schemas.microsoft.com/office/drawing/2010/main">
-                <a:solidFill>
-                  <a:srgbClr val="FFFFFF"/>
-                </a:solidFill>
-              </a14:hiddenFill>
-            </a:ext>
-            <a:ext uri="{91240B29-F687-4F45-9708-019B960494DF}">
-              <a14:hiddenLine xmlns:a14="http://schemas.microsoft.com/office/drawing/2010/main" w="9525">
-                <a:solidFill>
-                  <a:srgbClr val="000000"/>
-                </a:solidFill>
-                <a:miter lim="800000"/>
-                <a:headEnd/>
-                <a:tailEnd/>
-              </a14:hiddenLine>
-            </a:ext>
-          </a:extLst>
-        </p:spPr>
-        <p:txBody>
-          <a:bodyPr vert="horz" wrap="square" lIns="91440" tIns="45720" rIns="91440" bIns="45720" numCol="1" anchor="t" anchorCtr="0" compatLnSpc="1">
-            <a:prstTxWarp prst="textNoShape">
-              <a:avLst/>
-            </a:prstTxWarp>
-          </a:bodyPr>
-          <a:lstStyle/>
-          <a:p>
-            <a:pPr marL="0" marR="0" lvl="0" indent="0" defTabSz="914400" rtl="0" eaLnBrk="1" fontAlgn="base" latinLnBrk="0" hangingPunct="1">
-              <a:lnSpc>
-                <a:spcPct val="100000"/>
-              </a:lnSpc>
-              <a:spcBef>
-                <a:spcPct val="0"/>
-              </a:spcBef>
-              <a:spcAft>
-                <a:spcPct val="0"/>
-              </a:spcAft>
-              <a:buClrTx/>
-              <a:buSzTx/>
-              <a:buFontTx/>
-              <a:buNone/>
-              <a:tabLst/>
-            </a:pPr>
-            <a:r>
-              <a:rPr kumimoji="0" lang="fr-FR" altLang="fr-FR" sz="1100" b="0" i="0" u="none" strike="noStrike" cap="none" normalizeH="0" baseline="0" dirty="0" smtClean="0">
-                <a:ln>
-                  <a:noFill/>
-                </a:ln>
-                <a:solidFill>
-                  <a:schemeClr val="tx1"/>
-                </a:solidFill>
-                <a:effectLst/>
-                <a:latin typeface="Calibri" pitchFamily="34" charset="0"/>
-                <a:ea typeface="Calibri" pitchFamily="34" charset="0"/>
-                <a:cs typeface="Times New Roman" pitchFamily="18" charset="0"/>
-              </a:rPr>
-              <a:t>Requête http</a:t>
-            </a:r>
-            <a:br>
-              <a:rPr kumimoji="0" lang="fr-FR" altLang="fr-FR" sz="1100" b="0" i="0" u="none" strike="noStrike" cap="none" normalizeH="0" baseline="0" dirty="0" smtClean="0">
-                <a:ln>
-                  <a:noFill/>
-                </a:ln>
-                <a:solidFill>
-                  <a:schemeClr val="tx1"/>
-                </a:solidFill>
-                <a:effectLst/>
-                <a:latin typeface="Calibri" pitchFamily="34" charset="0"/>
-                <a:ea typeface="Calibri" pitchFamily="34" charset="0"/>
-                <a:cs typeface="Times New Roman" pitchFamily="18" charset="0"/>
-              </a:rPr>
-            </a:br>
-            <a:r>
-              <a:rPr kumimoji="0" lang="fr-FR" altLang="fr-FR" sz="1100" b="0" i="0" u="none" strike="noStrike" cap="none" normalizeH="0" baseline="0" dirty="0" smtClean="0">
-                <a:ln>
-                  <a:noFill/>
-                </a:ln>
-                <a:solidFill>
-                  <a:schemeClr val="tx1"/>
-                </a:solidFill>
-                <a:effectLst/>
-                <a:latin typeface="Calibri" pitchFamily="34" charset="0"/>
-                <a:ea typeface="Calibri" pitchFamily="34" charset="0"/>
-                <a:cs typeface="Times New Roman" pitchFamily="18" charset="0"/>
-              </a:rPr>
-              <a:t>GET /stages/1</a:t>
-            </a:r>
-            <a:endParaRPr kumimoji="0" lang="fr-FR" altLang="fr-FR" sz="1800" b="0" i="0" u="none" strike="noStrike" cap="none" normalizeH="0" baseline="0" dirty="0" smtClean="0">
-              <a:ln>
-                <a:noFill/>
-              </a:ln>
-              <a:solidFill>
-                <a:schemeClr val="tx1"/>
-              </a:solidFill>
-              <a:effectLst/>
-              <a:latin typeface="Arial" pitchFamily="34" charset="0"/>
-              <a:cs typeface="Arial" pitchFamily="34" charset="0"/>
-            </a:endParaRPr>
-          </a:p>
-        </p:txBody>
-      </p:sp>
-      <p:sp>
-        <p:nvSpPr>
-          <p:cNvPr id="21" name="Text Box 25"/>
-          <p:cNvSpPr txBox="1">
-            <a:spLocks noChangeArrowheads="1"/>
-          </p:cNvSpPr>
-          <p:nvPr/>
-        </p:nvSpPr>
-        <p:spPr bwMode="auto">
-          <a:xfrm>
-            <a:off x="2382763" y="2245296"/>
-            <a:ext cx="1226518" cy="323850"/>
-          </a:xfrm>
-          <a:prstGeom prst="rect">
-            <a:avLst/>
-          </a:prstGeom>
-          <a:noFill/>
-          <a:ln>
-            <a:noFill/>
-          </a:ln>
-          <a:extLst>
-            <a:ext uri="{909E8E84-426E-40DD-AFC4-6F175D3DCCD1}">
-              <a14:hiddenFill xmlns:a14="http://schemas.microsoft.com/office/drawing/2010/main">
-                <a:solidFill>
-                  <a:srgbClr val="FFFFFF"/>
-                </a:solidFill>
-              </a14:hiddenFill>
-            </a:ext>
-            <a:ext uri="{91240B29-F687-4F45-9708-019B960494DF}">
-              <a14:hiddenLine xmlns:a14="http://schemas.microsoft.com/office/drawing/2010/main" w="9525">
-                <a:solidFill>
-                  <a:srgbClr val="000000"/>
-                </a:solidFill>
-                <a:miter lim="800000"/>
-                <a:headEnd/>
-                <a:tailEnd/>
-              </a14:hiddenLine>
-            </a:ext>
-          </a:extLst>
-        </p:spPr>
-        <p:txBody>
-          <a:bodyPr vert="horz" wrap="square" lIns="91440" tIns="45720" rIns="91440" bIns="45720" numCol="1" anchor="t" anchorCtr="0" compatLnSpc="1">
-            <a:prstTxWarp prst="textNoShape">
-              <a:avLst/>
-            </a:prstTxWarp>
-          </a:bodyPr>
-          <a:lstStyle/>
-          <a:p>
-            <a:pPr marL="0" marR="0" lvl="0" indent="0" algn="ctr" defTabSz="914400" rtl="0" eaLnBrk="1" fontAlgn="base" latinLnBrk="0" hangingPunct="1">
-              <a:lnSpc>
-                <a:spcPct val="100000"/>
-              </a:lnSpc>
-              <a:spcBef>
-                <a:spcPct val="0"/>
-              </a:spcBef>
-              <a:spcAft>
-                <a:spcPct val="0"/>
-              </a:spcAft>
-              <a:buClrTx/>
-              <a:buSzTx/>
-              <a:buFontTx/>
-              <a:buNone/>
-              <a:tabLst/>
-            </a:pPr>
-            <a:r>
-              <a:rPr kumimoji="0" lang="fr-FR" altLang="fr-FR" sz="1100" b="0" i="0" u="none" strike="noStrike" cap="none" normalizeH="0" baseline="0" dirty="0" smtClean="0">
-                <a:ln>
-                  <a:noFill/>
-                </a:ln>
-                <a:solidFill>
-                  <a:schemeClr val="tx1"/>
-                </a:solidFill>
-                <a:effectLst/>
-                <a:latin typeface="Calibri" pitchFamily="34" charset="0"/>
-                <a:ea typeface="Calibri" pitchFamily="34" charset="0"/>
-                <a:cs typeface="Times New Roman" pitchFamily="18" charset="0"/>
-              </a:rPr>
-              <a:t>URL : /stages/1</a:t>
-            </a:r>
-            <a:endParaRPr kumimoji="0" lang="fr-FR" altLang="fr-FR" sz="1800" b="0" i="0" u="none" strike="noStrike" cap="none" normalizeH="0" baseline="0" dirty="0" smtClean="0">
-              <a:ln>
-                <a:noFill/>
-              </a:ln>
-              <a:solidFill>
-                <a:schemeClr val="tx1"/>
-              </a:solidFill>
-              <a:effectLst/>
-              <a:latin typeface="Arial" pitchFamily="34" charset="0"/>
-              <a:cs typeface="Arial" pitchFamily="34" charset="0"/>
-            </a:endParaRPr>
-          </a:p>
-        </p:txBody>
-      </p:sp>
-      <p:sp>
-        <p:nvSpPr>
-          <p:cNvPr id="22" name="Text Box 20"/>
-          <p:cNvSpPr txBox="1">
-            <a:spLocks noChangeArrowheads="1"/>
-          </p:cNvSpPr>
-          <p:nvPr/>
-        </p:nvSpPr>
-        <p:spPr bwMode="auto">
-          <a:xfrm>
-            <a:off x="2368097" y="2753544"/>
-            <a:ext cx="1438275" cy="323850"/>
-          </a:xfrm>
-          <a:prstGeom prst="rect">
-            <a:avLst/>
-          </a:prstGeom>
-          <a:noFill/>
-          <a:ln>
-            <a:noFill/>
-          </a:ln>
-          <a:extLst>
-            <a:ext uri="{909E8E84-426E-40DD-AFC4-6F175D3DCCD1}">
-              <a14:hiddenFill xmlns:a14="http://schemas.microsoft.com/office/drawing/2010/main">
-                <a:solidFill>
-                  <a:srgbClr val="FFFFFF"/>
-                </a:solidFill>
-              </a14:hiddenFill>
-            </a:ext>
-            <a:ext uri="{91240B29-F687-4F45-9708-019B960494DF}">
-              <a14:hiddenLine xmlns:a14="http://schemas.microsoft.com/office/drawing/2010/main" w="9525">
-                <a:solidFill>
-                  <a:srgbClr val="000000"/>
-                </a:solidFill>
-                <a:miter lim="800000"/>
-                <a:headEnd/>
-                <a:tailEnd/>
-              </a14:hiddenLine>
-            </a:ext>
-          </a:extLst>
-        </p:spPr>
-        <p:txBody>
-          <a:bodyPr vert="horz" wrap="square" lIns="91440" tIns="45720" rIns="91440" bIns="45720" numCol="1" anchor="t" anchorCtr="0" compatLnSpc="1">
-            <a:prstTxWarp prst="textNoShape">
-              <a:avLst/>
-            </a:prstTxWarp>
-          </a:bodyPr>
-          <a:lstStyle/>
-          <a:p>
-            <a:pPr marL="0" marR="0" lvl="0" indent="0" algn="ctr" defTabSz="914400" rtl="0" eaLnBrk="1" fontAlgn="base" latinLnBrk="0" hangingPunct="1">
-              <a:lnSpc>
-                <a:spcPct val="100000"/>
-              </a:lnSpc>
-              <a:spcBef>
-                <a:spcPct val="0"/>
-              </a:spcBef>
-              <a:spcAft>
-                <a:spcPct val="0"/>
-              </a:spcAft>
-              <a:buClrTx/>
-              <a:buSzTx/>
-              <a:buFontTx/>
-              <a:buNone/>
-              <a:tabLst/>
-            </a:pPr>
-            <a:r>
-              <a:rPr kumimoji="0" lang="fr-FR" altLang="fr-FR" sz="1100" b="0" i="0" u="none" strike="noStrike" cap="none" normalizeH="0" baseline="0" dirty="0" smtClean="0">
-                <a:ln>
-                  <a:noFill/>
-                </a:ln>
-                <a:solidFill>
-                  <a:schemeClr val="tx1"/>
-                </a:solidFill>
-                <a:effectLst/>
-                <a:latin typeface="Calibri" pitchFamily="34" charset="0"/>
-                <a:ea typeface="Calibri" pitchFamily="34" charset="0"/>
-                <a:cs typeface="Times New Roman" pitchFamily="18" charset="0"/>
-              </a:rPr>
-              <a:t>Contrôleur : EfStage:Voir(1)</a:t>
-            </a:r>
-            <a:endParaRPr kumimoji="0" lang="fr-FR" altLang="fr-FR" sz="1800" b="0" i="0" u="none" strike="noStrike" cap="none" normalizeH="0" baseline="0" dirty="0" smtClean="0">
-              <a:ln>
-                <a:noFill/>
-              </a:ln>
-              <a:solidFill>
-                <a:schemeClr val="tx1"/>
-              </a:solidFill>
-              <a:effectLst/>
-              <a:latin typeface="Arial" pitchFamily="34" charset="0"/>
-              <a:cs typeface="Arial" pitchFamily="34" charset="0"/>
-            </a:endParaRPr>
-          </a:p>
-        </p:txBody>
-      </p:sp>
-      <p:sp>
-        <p:nvSpPr>
-          <p:cNvPr id="23" name="Text Box 21"/>
-          <p:cNvSpPr txBox="1">
-            <a:spLocks noChangeArrowheads="1"/>
-          </p:cNvSpPr>
-          <p:nvPr/>
-        </p:nvSpPr>
-        <p:spPr bwMode="auto">
-          <a:xfrm>
-            <a:off x="2200275" y="3259634"/>
-            <a:ext cx="1677082" cy="347662"/>
-          </a:xfrm>
-          <a:prstGeom prst="rect">
-            <a:avLst/>
-          </a:prstGeom>
-          <a:noFill/>
-          <a:ln>
-            <a:noFill/>
-          </a:ln>
-          <a:extLst>
-            <a:ext uri="{909E8E84-426E-40DD-AFC4-6F175D3DCCD1}">
-              <a14:hiddenFill xmlns:a14="http://schemas.microsoft.com/office/drawing/2010/main">
-                <a:solidFill>
-                  <a:srgbClr val="FFFFFF"/>
-                </a:solidFill>
-              </a14:hiddenFill>
-            </a:ext>
-            <a:ext uri="{91240B29-F687-4F45-9708-019B960494DF}">
-              <a14:hiddenLine xmlns:a14="http://schemas.microsoft.com/office/drawing/2010/main" w="9525">
-                <a:solidFill>
-                  <a:srgbClr val="000000"/>
-                </a:solidFill>
-                <a:miter lim="800000"/>
-                <a:headEnd/>
-                <a:tailEnd/>
-              </a14:hiddenLine>
-            </a:ext>
-          </a:extLst>
-        </p:spPr>
-        <p:txBody>
-          <a:bodyPr vert="horz" wrap="square" lIns="91440" tIns="45720" rIns="91440" bIns="45720" numCol="1" anchor="t" anchorCtr="0" compatLnSpc="1">
-            <a:prstTxWarp prst="textNoShape">
-              <a:avLst/>
-            </a:prstTxWarp>
-          </a:bodyPr>
-          <a:lstStyle/>
-          <a:p>
-            <a:pPr marL="0" marR="0" lvl="0" indent="0" algn="ctr" defTabSz="914400" rtl="0" eaLnBrk="1" fontAlgn="base" latinLnBrk="0" hangingPunct="1">
-              <a:lnSpc>
-                <a:spcPct val="100000"/>
-              </a:lnSpc>
-              <a:spcBef>
-                <a:spcPct val="0"/>
-              </a:spcBef>
-              <a:spcAft>
-                <a:spcPct val="0"/>
-              </a:spcAft>
-              <a:buClrTx/>
-              <a:buSzTx/>
-              <a:buFontTx/>
-              <a:buNone/>
-              <a:tabLst/>
-            </a:pPr>
-            <a:r>
-              <a:rPr kumimoji="0" lang="fr-FR" altLang="fr-FR" sz="1100" b="0" i="0" u="none" strike="noStrike" cap="none" normalizeH="0" baseline="0" dirty="0" smtClean="0">
-                <a:ln>
-                  <a:noFill/>
-                </a:ln>
-                <a:solidFill>
-                  <a:schemeClr val="tx1"/>
-                </a:solidFill>
-                <a:effectLst/>
-                <a:latin typeface="Calibri" pitchFamily="34" charset="0"/>
-                <a:ea typeface="Calibri" pitchFamily="34" charset="0"/>
-                <a:cs typeface="Times New Roman" pitchFamily="18" charset="0"/>
-              </a:rPr>
-              <a:t>Demande : le stage qui a pour identifiant : 1</a:t>
-            </a:r>
-            <a:endParaRPr kumimoji="0" lang="fr-FR" altLang="fr-FR" sz="1800" b="0" i="0" u="none" strike="noStrike" cap="none" normalizeH="0" baseline="0" dirty="0" smtClean="0">
-              <a:ln>
-                <a:noFill/>
-              </a:ln>
-              <a:solidFill>
-                <a:schemeClr val="tx1"/>
-              </a:solidFill>
-              <a:effectLst/>
-              <a:latin typeface="Arial" pitchFamily="34" charset="0"/>
-              <a:cs typeface="Arial" pitchFamily="34" charset="0"/>
-            </a:endParaRPr>
-          </a:p>
-        </p:txBody>
-      </p:sp>
-      <p:sp>
-        <p:nvSpPr>
-          <p:cNvPr id="24" name="Text Box 22"/>
-          <p:cNvSpPr txBox="1">
-            <a:spLocks noChangeArrowheads="1"/>
-          </p:cNvSpPr>
-          <p:nvPr/>
-        </p:nvSpPr>
-        <p:spPr bwMode="auto">
-          <a:xfrm>
-            <a:off x="2289944" y="3931072"/>
-            <a:ext cx="1638300" cy="286306"/>
-          </a:xfrm>
-          <a:prstGeom prst="rect">
-            <a:avLst/>
-          </a:prstGeom>
-          <a:noFill/>
-          <a:ln>
-            <a:noFill/>
-          </a:ln>
-          <a:extLst>
-            <a:ext uri="{909E8E84-426E-40DD-AFC4-6F175D3DCCD1}">
-              <a14:hiddenFill xmlns:a14="http://schemas.microsoft.com/office/drawing/2010/main">
-                <a:solidFill>
-                  <a:srgbClr val="FFFFFF"/>
-                </a:solidFill>
-              </a14:hiddenFill>
-            </a:ext>
-            <a:ext uri="{91240B29-F687-4F45-9708-019B960494DF}">
-              <a14:hiddenLine xmlns:a14="http://schemas.microsoft.com/office/drawing/2010/main" w="9525">
-                <a:solidFill>
-                  <a:srgbClr val="000000"/>
-                </a:solidFill>
-                <a:miter lim="800000"/>
-                <a:headEnd/>
-                <a:tailEnd/>
-              </a14:hiddenLine>
-            </a:ext>
-          </a:extLst>
-        </p:spPr>
-        <p:txBody>
-          <a:bodyPr vert="horz" wrap="square" lIns="91440" tIns="45720" rIns="91440" bIns="45720" numCol="1" anchor="t" anchorCtr="0" compatLnSpc="1">
-            <a:prstTxWarp prst="textNoShape">
-              <a:avLst/>
-            </a:prstTxWarp>
-          </a:bodyPr>
-          <a:lstStyle/>
-          <a:p>
-            <a:pPr marL="0" marR="0" lvl="0" indent="0" algn="ctr" defTabSz="914400" rtl="0" eaLnBrk="1" fontAlgn="base" latinLnBrk="0" hangingPunct="1">
-              <a:lnSpc>
-                <a:spcPct val="100000"/>
-              </a:lnSpc>
-              <a:spcBef>
-                <a:spcPct val="0"/>
-              </a:spcBef>
-              <a:spcAft>
-                <a:spcPct val="0"/>
-              </a:spcAft>
-              <a:buClrTx/>
-              <a:buSzTx/>
-              <a:buFontTx/>
-              <a:buNone/>
-              <a:tabLst/>
-            </a:pPr>
-            <a:r>
-              <a:rPr kumimoji="0" lang="fr-FR" altLang="fr-FR" sz="1100" b="0" i="0" u="none" strike="noStrike" cap="none" normalizeH="0" baseline="0" dirty="0" smtClean="0">
-                <a:ln>
-                  <a:noFill/>
-                </a:ln>
-                <a:solidFill>
-                  <a:schemeClr val="tx1"/>
-                </a:solidFill>
-                <a:effectLst/>
-                <a:latin typeface="Calibri" pitchFamily="34" charset="0"/>
-                <a:ea typeface="Calibri" pitchFamily="34" charset="0"/>
-                <a:cs typeface="Times New Roman" pitchFamily="18" charset="0"/>
-              </a:rPr>
-              <a:t>Donne le stage demandé</a:t>
-            </a:r>
-            <a:endParaRPr kumimoji="0" lang="fr-FR" altLang="fr-FR" sz="1800" b="0" i="0" u="none" strike="noStrike" cap="none" normalizeH="0" baseline="0" dirty="0" smtClean="0">
-              <a:ln>
-                <a:noFill/>
-              </a:ln>
-              <a:solidFill>
-                <a:schemeClr val="tx1"/>
-              </a:solidFill>
-              <a:effectLst/>
-              <a:latin typeface="Arial" pitchFamily="34" charset="0"/>
-              <a:cs typeface="Arial" pitchFamily="34" charset="0"/>
-            </a:endParaRPr>
-          </a:p>
-        </p:txBody>
-      </p:sp>
-      <p:sp>
-        <p:nvSpPr>
-          <p:cNvPr id="25" name="Text Box 23"/>
-          <p:cNvSpPr txBox="1">
-            <a:spLocks noChangeArrowheads="1"/>
-          </p:cNvSpPr>
-          <p:nvPr/>
-        </p:nvSpPr>
-        <p:spPr bwMode="auto">
-          <a:xfrm>
-            <a:off x="2464718" y="4499089"/>
-            <a:ext cx="1062608" cy="270679"/>
-          </a:xfrm>
-          <a:prstGeom prst="rect">
-            <a:avLst/>
-          </a:prstGeom>
-          <a:noFill/>
-          <a:ln>
-            <a:noFill/>
-          </a:ln>
-          <a:extLst>
-            <a:ext uri="{909E8E84-426E-40DD-AFC4-6F175D3DCCD1}">
-              <a14:hiddenFill xmlns:a14="http://schemas.microsoft.com/office/drawing/2010/main">
-                <a:solidFill>
-                  <a:srgbClr val="FFFFFF"/>
-                </a:solidFill>
-              </a14:hiddenFill>
-            </a:ext>
-            <a:ext uri="{91240B29-F687-4F45-9708-019B960494DF}">
-              <a14:hiddenLine xmlns:a14="http://schemas.microsoft.com/office/drawing/2010/main" w="9525">
-                <a:solidFill>
-                  <a:srgbClr val="000000"/>
-                </a:solidFill>
-                <a:miter lim="800000"/>
-                <a:headEnd/>
-                <a:tailEnd/>
-              </a14:hiddenLine>
-            </a:ext>
-          </a:extLst>
-        </p:spPr>
-        <p:txBody>
-          <a:bodyPr vert="horz" wrap="square" lIns="91440" tIns="45720" rIns="91440" bIns="45720" numCol="1" anchor="t" anchorCtr="0" compatLnSpc="1">
-            <a:prstTxWarp prst="textNoShape">
-              <a:avLst/>
-            </a:prstTxWarp>
-          </a:bodyPr>
-          <a:lstStyle/>
-          <a:p>
-            <a:pPr marL="0" marR="0" lvl="0" indent="0" algn="ctr" defTabSz="914400" rtl="0" eaLnBrk="1" fontAlgn="base" latinLnBrk="0" hangingPunct="1">
-              <a:lnSpc>
-                <a:spcPct val="100000"/>
-              </a:lnSpc>
-              <a:spcBef>
-                <a:spcPct val="0"/>
-              </a:spcBef>
-              <a:spcAft>
-                <a:spcPct val="0"/>
-              </a:spcAft>
-              <a:buClrTx/>
-              <a:buSzTx/>
-              <a:buFontTx/>
-              <a:buNone/>
-              <a:tabLst/>
-            </a:pPr>
-            <a:r>
-              <a:rPr kumimoji="0" lang="fr-FR" altLang="fr-FR" sz="1100" b="0" i="0" u="none" strike="noStrike" cap="none" normalizeH="0" baseline="0" dirty="0" smtClean="0">
-                <a:ln>
-                  <a:noFill/>
-                </a:ln>
-                <a:solidFill>
-                  <a:schemeClr val="tx1"/>
-                </a:solidFill>
-                <a:effectLst/>
-                <a:latin typeface="Calibri" pitchFamily="34" charset="0"/>
-                <a:ea typeface="Calibri" pitchFamily="34" charset="0"/>
-                <a:cs typeface="Times New Roman" pitchFamily="18" charset="0"/>
-              </a:rPr>
-              <a:t>Donne le stage</a:t>
-            </a:r>
-            <a:endParaRPr kumimoji="0" lang="fr-FR" altLang="fr-FR" sz="1800" b="0" i="0" u="none" strike="noStrike" cap="none" normalizeH="0" baseline="0" dirty="0" smtClean="0">
-              <a:ln>
-                <a:noFill/>
-              </a:ln>
-              <a:solidFill>
-                <a:schemeClr val="tx1"/>
-              </a:solidFill>
-              <a:effectLst/>
-              <a:latin typeface="Arial" pitchFamily="34" charset="0"/>
-              <a:cs typeface="Arial" pitchFamily="34" charset="0"/>
-            </a:endParaRPr>
-          </a:p>
-        </p:txBody>
-      </p:sp>
-      <p:sp>
-        <p:nvSpPr>
-          <p:cNvPr id="26" name="Text Box 24"/>
-          <p:cNvSpPr txBox="1">
-            <a:spLocks noChangeArrowheads="1"/>
-          </p:cNvSpPr>
-          <p:nvPr/>
-        </p:nvSpPr>
-        <p:spPr bwMode="auto">
-          <a:xfrm>
-            <a:off x="2382764" y="4942359"/>
-            <a:ext cx="1423608" cy="432048"/>
-          </a:xfrm>
-          <a:prstGeom prst="rect">
-            <a:avLst/>
-          </a:prstGeom>
-          <a:noFill/>
-          <a:ln>
-            <a:noFill/>
-          </a:ln>
-          <a:extLst>
-            <a:ext uri="{909E8E84-426E-40DD-AFC4-6F175D3DCCD1}">
-              <a14:hiddenFill xmlns:a14="http://schemas.microsoft.com/office/drawing/2010/main">
-                <a:solidFill>
-                  <a:srgbClr val="FFFFFF"/>
-                </a:solidFill>
-              </a14:hiddenFill>
-            </a:ext>
-            <a:ext uri="{91240B29-F687-4F45-9708-019B960494DF}">
-              <a14:hiddenLine xmlns:a14="http://schemas.microsoft.com/office/drawing/2010/main" w="9525">
-                <a:solidFill>
-                  <a:srgbClr val="000000"/>
-                </a:solidFill>
-                <a:miter lim="800000"/>
-                <a:headEnd/>
-                <a:tailEnd/>
-              </a14:hiddenLine>
-            </a:ext>
-          </a:extLst>
-        </p:spPr>
-        <p:txBody>
-          <a:bodyPr vert="horz" wrap="square" lIns="91440" tIns="45720" rIns="91440" bIns="45720" numCol="1" anchor="t" anchorCtr="0" compatLnSpc="1">
-            <a:prstTxWarp prst="textNoShape">
-              <a:avLst/>
-            </a:prstTxWarp>
-          </a:bodyPr>
-          <a:lstStyle/>
-          <a:p>
-            <a:pPr marL="0" marR="0" lvl="0" indent="0" algn="ctr" defTabSz="914400" rtl="0" eaLnBrk="1" fontAlgn="base" latinLnBrk="0" hangingPunct="1">
-              <a:lnSpc>
-                <a:spcPct val="100000"/>
-              </a:lnSpc>
-              <a:spcBef>
-                <a:spcPct val="0"/>
-              </a:spcBef>
-              <a:spcAft>
-                <a:spcPct val="0"/>
-              </a:spcAft>
-              <a:buClrTx/>
-              <a:buSzTx/>
-              <a:buFontTx/>
-              <a:buNone/>
-              <a:tabLst/>
-            </a:pPr>
-            <a:r>
-              <a:rPr kumimoji="0" lang="fr-FR" altLang="fr-FR" sz="1100" b="0" i="0" u="none" strike="noStrike" cap="none" normalizeH="0" baseline="0" dirty="0" smtClean="0">
-                <a:ln>
-                  <a:noFill/>
-                </a:ln>
-                <a:solidFill>
-                  <a:schemeClr val="tx1"/>
-                </a:solidFill>
-                <a:effectLst/>
-                <a:latin typeface="Calibri" pitchFamily="34" charset="0"/>
-                <a:ea typeface="Calibri" pitchFamily="34" charset="0"/>
-                <a:cs typeface="Times New Roman" pitchFamily="18" charset="0"/>
-              </a:rPr>
-              <a:t>Donne la page html</a:t>
-            </a:r>
-            <a:endParaRPr kumimoji="0" lang="fr-FR" altLang="fr-FR" sz="1800" b="0" i="0" u="none" strike="noStrike" cap="none" normalizeH="0" baseline="0" dirty="0" smtClean="0">
-              <a:ln>
-                <a:noFill/>
-              </a:ln>
-              <a:solidFill>
-                <a:schemeClr val="tx1"/>
-              </a:solidFill>
-              <a:effectLst/>
-              <a:latin typeface="Arial" pitchFamily="34" charset="0"/>
-              <a:cs typeface="Arial" pitchFamily="34" charset="0"/>
-            </a:endParaRPr>
-          </a:p>
-        </p:txBody>
-      </p:sp>
-      <p:pic>
-        <p:nvPicPr>
-          <p:cNvPr id="27" name="Picture 2" descr="ordinateur-moniteur-ecran-icone-8084-128"/>
-          <p:cNvPicPr>
-            <a:picLocks noChangeAspect="1" noChangeArrowheads="1"/>
-          </p:cNvPicPr>
-          <p:nvPr/>
-        </p:nvPicPr>
-        <p:blipFill>
-          <a:blip r:embed="rId2">
-            <a:extLst>
-              <a:ext uri="{28A0092B-C50C-407E-A947-70E740481C1C}">
-                <a14:useLocalDpi xmlns:a14="http://schemas.microsoft.com/office/drawing/2010/main" val="0"/>
-              </a:ext>
-            </a:extLst>
-          </a:blip>
-          <a:srcRect/>
-          <a:stretch>
-            <a:fillRect/>
-          </a:stretch>
-        </p:blipFill>
-        <p:spPr bwMode="auto">
-          <a:xfrm>
-            <a:off x="1039812" y="5921896"/>
-            <a:ext cx="714376" cy="714376"/>
-          </a:xfrm>
-          <a:prstGeom prst="rect">
-            <a:avLst/>
-          </a:prstGeom>
-          <a:noFill/>
-          <a:extLst>
-            <a:ext uri="{909E8E84-426E-40DD-AFC4-6F175D3DCCD1}">
-              <a14:hiddenFill xmlns:a14="http://schemas.microsoft.com/office/drawing/2010/main">
-                <a:solidFill>
-                  <a:srgbClr val="FFFFFF"/>
-                </a:solidFill>
-              </a14:hiddenFill>
-            </a:ext>
-          </a:extLst>
-        </p:spPr>
-      </p:pic>
-      <p:sp>
-        <p:nvSpPr>
-          <p:cNvPr id="28" name="Rectangle 293"/>
-          <p:cNvSpPr>
-            <a:spLocks noChangeArrowheads="1"/>
-          </p:cNvSpPr>
-          <p:nvPr/>
-        </p:nvSpPr>
-        <p:spPr bwMode="auto">
-          <a:xfrm>
-            <a:off x="3877357" y="2327847"/>
-            <a:ext cx="1594756" cy="658232"/>
-          </a:xfrm>
-          <a:prstGeom prst="rect">
-            <a:avLst/>
-          </a:prstGeom>
-          <a:solidFill>
-            <a:srgbClr val="548DD4"/>
-          </a:solidFill>
-          <a:ln>
-            <a:noFill/>
-          </a:ln>
-          <a:effectLst>
-            <a:outerShdw dist="38100" dir="2700000" algn="tl" rotWithShape="0">
-              <a:srgbClr val="000000">
-                <a:alpha val="39999"/>
-              </a:srgbClr>
-            </a:outerShdw>
-          </a:effectLst>
-          <a:extLst>
-            <a:ext uri="{91240B29-F687-4F45-9708-019B960494DF}">
-              <a14:hiddenLine xmlns:a14="http://schemas.microsoft.com/office/drawing/2010/main" w="25400">
-                <a:solidFill>
-                  <a:srgbClr val="000000"/>
-                </a:solidFill>
-                <a:miter lim="800000"/>
-                <a:headEnd/>
-                <a:tailEnd/>
-              </a14:hiddenLine>
-            </a:ext>
-          </a:extLst>
-        </p:spPr>
-        <p:txBody>
-          <a:bodyPr vert="horz" wrap="square" lIns="91440" tIns="45720" rIns="91440" bIns="45720" numCol="1" anchor="ctr" anchorCtr="0" compatLnSpc="1">
-            <a:prstTxWarp prst="textNoShape">
-              <a:avLst/>
-            </a:prstTxWarp>
-          </a:bodyPr>
-          <a:lstStyle/>
-          <a:p>
-            <a:pPr marL="0" marR="0" lvl="0" indent="0" algn="ctr" defTabSz="914400" rtl="0" eaLnBrk="1" fontAlgn="base" latinLnBrk="0" hangingPunct="1">
-              <a:lnSpc>
-                <a:spcPct val="100000"/>
-              </a:lnSpc>
-              <a:spcBef>
-                <a:spcPct val="0"/>
-              </a:spcBef>
-              <a:spcAft>
-                <a:spcPct val="0"/>
-              </a:spcAft>
-              <a:buClrTx/>
-              <a:buSzTx/>
-              <a:buFontTx/>
-              <a:buNone/>
-              <a:tabLst/>
-            </a:pPr>
-            <a:r>
-              <a:rPr kumimoji="0" lang="fr-FR" altLang="fr-FR" sz="1400" b="0" i="0" u="none" strike="noStrike" cap="none" normalizeH="0" baseline="0" dirty="0" smtClean="0">
-                <a:ln>
-                  <a:noFill/>
-                </a:ln>
-                <a:solidFill>
-                  <a:schemeClr val="tx1"/>
-                </a:solidFill>
-                <a:effectLst/>
-                <a:latin typeface="Calibri" pitchFamily="34" charset="0"/>
-                <a:ea typeface="Calibri" pitchFamily="34" charset="0"/>
-                <a:cs typeface="Times New Roman" pitchFamily="18" charset="0"/>
-              </a:rPr>
-              <a:t>Routeur</a:t>
-            </a:r>
-            <a:endParaRPr kumimoji="0" lang="fr-FR" altLang="fr-FR" sz="1800" b="0" i="0" u="none" strike="noStrike" cap="none" normalizeH="0" baseline="0" dirty="0" smtClean="0">
-              <a:ln>
-                <a:noFill/>
-              </a:ln>
-              <a:solidFill>
-                <a:schemeClr val="tx1"/>
-              </a:solidFill>
-              <a:effectLst/>
-              <a:latin typeface="Arial" pitchFamily="34" charset="0"/>
-              <a:cs typeface="Arial" pitchFamily="34" charset="0"/>
-            </a:endParaRPr>
-          </a:p>
-        </p:txBody>
-      </p:sp>
-      <p:sp>
-        <p:nvSpPr>
-          <p:cNvPr id="29" name="Zone de texte 2"/>
-          <p:cNvSpPr txBox="1">
-            <a:spLocks noChangeArrowheads="1"/>
-          </p:cNvSpPr>
-          <p:nvPr/>
-        </p:nvSpPr>
-        <p:spPr bwMode="auto">
-          <a:xfrm>
-            <a:off x="1343695" y="5403181"/>
-            <a:ext cx="776288" cy="266700"/>
-          </a:xfrm>
-          <a:prstGeom prst="rect">
-            <a:avLst/>
-          </a:prstGeom>
-          <a:noFill/>
-          <a:ln>
-            <a:noFill/>
-          </a:ln>
-          <a:extLst>
-            <a:ext uri="{909E8E84-426E-40DD-AFC4-6F175D3DCCD1}">
-              <a14:hiddenFill xmlns:a14="http://schemas.microsoft.com/office/drawing/2010/main">
-                <a:solidFill>
-                  <a:srgbClr val="FFFFFF"/>
-                </a:solidFill>
-              </a14:hiddenFill>
-            </a:ext>
-            <a:ext uri="{91240B29-F687-4F45-9708-019B960494DF}">
-              <a14:hiddenLine xmlns:a14="http://schemas.microsoft.com/office/drawing/2010/main" w="9525">
-                <a:solidFill>
-                  <a:srgbClr val="000000"/>
-                </a:solidFill>
-                <a:miter lim="800000"/>
-                <a:headEnd/>
-                <a:tailEnd/>
-              </a14:hiddenLine>
-            </a:ext>
-          </a:extLst>
-        </p:spPr>
-        <p:txBody>
-          <a:bodyPr vert="horz" wrap="square" lIns="91440" tIns="45720" rIns="91440" bIns="45720" numCol="1" anchor="t" anchorCtr="0" compatLnSpc="1">
-            <a:prstTxWarp prst="textNoShape">
-              <a:avLst/>
-            </a:prstTxWarp>
-          </a:bodyPr>
-          <a:lstStyle/>
-          <a:p>
-            <a:pPr marL="0" marR="0" lvl="0" indent="0" defTabSz="914400" rtl="0" eaLnBrk="1" fontAlgn="base" latinLnBrk="0" hangingPunct="1">
-              <a:lnSpc>
-                <a:spcPct val="100000"/>
-              </a:lnSpc>
-              <a:spcBef>
-                <a:spcPct val="0"/>
-              </a:spcBef>
-              <a:spcAft>
-                <a:spcPct val="0"/>
-              </a:spcAft>
-              <a:buClrTx/>
-              <a:buSzTx/>
-              <a:buFontTx/>
-              <a:buNone/>
-              <a:tabLst/>
-            </a:pPr>
-            <a:r>
-              <a:rPr kumimoji="0" lang="fr-FR" altLang="fr-FR" sz="1100" b="0" i="0" u="none" strike="noStrike" cap="none" normalizeH="0" baseline="0" dirty="0" smtClean="0">
-                <a:ln>
-                  <a:noFill/>
-                </a:ln>
-                <a:solidFill>
-                  <a:schemeClr val="tx1"/>
-                </a:solidFill>
-                <a:effectLst/>
-                <a:latin typeface="Calibri" pitchFamily="34" charset="0"/>
-                <a:ea typeface="Calibri" pitchFamily="34" charset="0"/>
-                <a:cs typeface="Times New Roman" pitchFamily="18" charset="0"/>
-              </a:rPr>
-              <a:t>Page html</a:t>
-            </a:r>
-            <a:endParaRPr kumimoji="0" lang="fr-FR" altLang="fr-FR" sz="1800" b="0" i="0" u="none" strike="noStrike" cap="none" normalizeH="0" baseline="0" dirty="0" smtClean="0">
-              <a:ln>
-                <a:noFill/>
-              </a:ln>
-              <a:solidFill>
-                <a:schemeClr val="tx1"/>
-              </a:solidFill>
-              <a:effectLst/>
-              <a:latin typeface="Arial" pitchFamily="34" charset="0"/>
-              <a:cs typeface="Arial" pitchFamily="34" charset="0"/>
-            </a:endParaRPr>
-          </a:p>
-        </p:txBody>
-      </p:sp>
-    </p:spTree>
-    <p:extLst>
-      <p:ext uri="{BB962C8B-B14F-4D97-AF65-F5344CB8AC3E}">
-        <p14:creationId xmlns:p14="http://schemas.microsoft.com/office/powerpoint/2010/main" val="2607102765"/>
-      </p:ext>
-    </p:extLst>
-  </p:cSld>
-  <p:clrMapOvr>
-    <a:masterClrMapping/>
-  </p:clrMapOvr>
-  <p:timing>
-    <p:tnLst>
-      <p:par>
-        <p:cTn id="1" dur="indefinite" restart="never" nodeType="tmRoot"/>
-      </p:par>
-    </p:tnLst>
-  </p:timing>
-</p:sld>
-</file>
-
-<file path=ppt/slides/slide4.xml><?xml version="1.0" encoding="utf-8"?>
 <p:sld xmlns:a="http://schemas.openxmlformats.org/drawingml/2006/main" xmlns:r="http://schemas.openxmlformats.org/officeDocument/2006/relationships" xmlns:p="http://schemas.openxmlformats.org/presentationml/2006/main">
   <p:cSld>
     <p:spTree>
@@ -10039,7 +8220,7 @@
 </p:sld>
 </file>
 
-<file path=ppt/slides/slide5.xml><?xml version="1.0" encoding="utf-8"?>
+<file path=ppt/slides/slide4.xml><?xml version="1.0" encoding="utf-8"?>
 <p:sld xmlns:a="http://schemas.openxmlformats.org/drawingml/2006/main" xmlns:r="http://schemas.openxmlformats.org/officeDocument/2006/relationships" xmlns:p="http://schemas.openxmlformats.org/presentationml/2006/main">
   <p:cSld>
     <p:spTree>

</xml_diff>

<commit_message>
SF Slides Add DI part
</commit_message>
<xml_diff>
--- a/slides/symfony2-basics-conserto/img/schema.pptx
+++ b/slides/symfony2-basics-conserto/img/schema.pptx
@@ -2808,7 +2808,7 @@
           <a:p>
             <a:fld id="{6B66237F-26FC-48D6-ABF0-4BFD7085687A}" type="datetimeFigureOut">
               <a:rPr lang="fr-FR" smtClean="0"/>
-              <a:t>16/11/2015</a:t>
+              <a:t>17/11/2015</a:t>
             </a:fld>
             <a:endParaRPr lang="fr-FR"/>
           </a:p>
@@ -2978,7 +2978,7 @@
           <a:p>
             <a:fld id="{6B66237F-26FC-48D6-ABF0-4BFD7085687A}" type="datetimeFigureOut">
               <a:rPr lang="fr-FR" smtClean="0"/>
-              <a:t>16/11/2015</a:t>
+              <a:t>17/11/2015</a:t>
             </a:fld>
             <a:endParaRPr lang="fr-FR"/>
           </a:p>
@@ -3158,7 +3158,7 @@
           <a:p>
             <a:fld id="{6B66237F-26FC-48D6-ABF0-4BFD7085687A}" type="datetimeFigureOut">
               <a:rPr lang="fr-FR" smtClean="0"/>
-              <a:t>16/11/2015</a:t>
+              <a:t>17/11/2015</a:t>
             </a:fld>
             <a:endParaRPr lang="fr-FR"/>
           </a:p>
@@ -3328,7 +3328,7 @@
           <a:p>
             <a:fld id="{6B66237F-26FC-48D6-ABF0-4BFD7085687A}" type="datetimeFigureOut">
               <a:rPr lang="fr-FR" smtClean="0"/>
-              <a:t>16/11/2015</a:t>
+              <a:t>17/11/2015</a:t>
             </a:fld>
             <a:endParaRPr lang="fr-FR"/>
           </a:p>
@@ -3574,7 +3574,7 @@
           <a:p>
             <a:fld id="{6B66237F-26FC-48D6-ABF0-4BFD7085687A}" type="datetimeFigureOut">
               <a:rPr lang="fr-FR" smtClean="0"/>
-              <a:t>16/11/2015</a:t>
+              <a:t>17/11/2015</a:t>
             </a:fld>
             <a:endParaRPr lang="fr-FR"/>
           </a:p>
@@ -3806,7 +3806,7 @@
           <a:p>
             <a:fld id="{6B66237F-26FC-48D6-ABF0-4BFD7085687A}" type="datetimeFigureOut">
               <a:rPr lang="fr-FR" smtClean="0"/>
-              <a:t>16/11/2015</a:t>
+              <a:t>17/11/2015</a:t>
             </a:fld>
             <a:endParaRPr lang="fr-FR"/>
           </a:p>
@@ -4173,7 +4173,7 @@
           <a:p>
             <a:fld id="{6B66237F-26FC-48D6-ABF0-4BFD7085687A}" type="datetimeFigureOut">
               <a:rPr lang="fr-FR" smtClean="0"/>
-              <a:t>16/11/2015</a:t>
+              <a:t>17/11/2015</a:t>
             </a:fld>
             <a:endParaRPr lang="fr-FR"/>
           </a:p>
@@ -4291,7 +4291,7 @@
           <a:p>
             <a:fld id="{6B66237F-26FC-48D6-ABF0-4BFD7085687A}" type="datetimeFigureOut">
               <a:rPr lang="fr-FR" smtClean="0"/>
-              <a:t>16/11/2015</a:t>
+              <a:t>17/11/2015</a:t>
             </a:fld>
             <a:endParaRPr lang="fr-FR"/>
           </a:p>
@@ -4386,7 +4386,7 @@
           <a:p>
             <a:fld id="{6B66237F-26FC-48D6-ABF0-4BFD7085687A}" type="datetimeFigureOut">
               <a:rPr lang="fr-FR" smtClean="0"/>
-              <a:t>16/11/2015</a:t>
+              <a:t>17/11/2015</a:t>
             </a:fld>
             <a:endParaRPr lang="fr-FR"/>
           </a:p>
@@ -4663,7 +4663,7 @@
           <a:p>
             <a:fld id="{6B66237F-26FC-48D6-ABF0-4BFD7085687A}" type="datetimeFigureOut">
               <a:rPr lang="fr-FR" smtClean="0"/>
-              <a:t>16/11/2015</a:t>
+              <a:t>17/11/2015</a:t>
             </a:fld>
             <a:endParaRPr lang="fr-FR"/>
           </a:p>
@@ -4916,7 +4916,7 @@
           <a:p>
             <a:fld id="{6B66237F-26FC-48D6-ABF0-4BFD7085687A}" type="datetimeFigureOut">
               <a:rPr lang="fr-FR" smtClean="0"/>
-              <a:t>16/11/2015</a:t>
+              <a:t>17/11/2015</a:t>
             </a:fld>
             <a:endParaRPr lang="fr-FR"/>
           </a:p>
@@ -5129,7 +5129,7 @@
           <a:p>
             <a:fld id="{6B66237F-26FC-48D6-ABF0-4BFD7085687A}" type="datetimeFigureOut">
               <a:rPr lang="fr-FR" smtClean="0"/>
-              <a:t>16/11/2015</a:t>
+              <a:t>17/11/2015</a:t>
             </a:fld>
             <a:endParaRPr lang="fr-FR"/>
           </a:p>
@@ -8955,6 +8955,115 @@
           </a:prstGeom>
         </p:spPr>
       </p:pic>
+      <p:sp>
+        <p:nvSpPr>
+          <p:cNvPr id="3" name="Organigramme : Disque magnétique 2"/>
+          <p:cNvSpPr/>
+          <p:nvPr/>
+        </p:nvSpPr>
+        <p:spPr>
+          <a:xfrm>
+            <a:off x="736979" y="436728"/>
+            <a:ext cx="2292824" cy="3096801"/>
+          </a:xfrm>
+          <a:prstGeom prst="flowChartMagneticDisk">
+            <a:avLst/>
+          </a:prstGeom>
+          <a:ln>
+            <a:solidFill>
+              <a:schemeClr val="accent3">
+                <a:lumMod val="50000"/>
+              </a:schemeClr>
+            </a:solidFill>
+          </a:ln>
+        </p:spPr>
+        <p:style>
+          <a:lnRef idx="1">
+            <a:schemeClr val="accent4"/>
+          </a:lnRef>
+          <a:fillRef idx="3">
+            <a:schemeClr val="accent4"/>
+          </a:fillRef>
+          <a:effectRef idx="2">
+            <a:schemeClr val="accent4"/>
+          </a:effectRef>
+          <a:fontRef idx="minor">
+            <a:schemeClr val="lt1"/>
+          </a:fontRef>
+        </p:style>
+        <p:txBody>
+          <a:bodyPr rtlCol="0" anchor="ctr"/>
+          <a:lstStyle/>
+          <a:p>
+            <a:pPr algn="ctr"/>
+            <a:r>
+              <a:rPr lang="fr-FR" sz="2000" dirty="0" smtClean="0"/>
+              <a:t/>
+            </a:r>
+            <a:br>
+              <a:rPr lang="fr-FR" sz="2000" dirty="0" smtClean="0"/>
+            </a:br>
+            <a:r>
+              <a:rPr lang="fr-FR" sz="2000" dirty="0" smtClean="0"/>
+              <a:t/>
+            </a:r>
+            <a:br>
+              <a:rPr lang="fr-FR" sz="2000" dirty="0" smtClean="0"/>
+            </a:br>
+            <a:r>
+              <a:rPr lang="fr-FR" sz="2000" u="sng" dirty="0" smtClean="0"/>
+              <a:t>Service Container</a:t>
+            </a:r>
+            <a:r>
+              <a:rPr lang="fr-FR" sz="2000" dirty="0" smtClean="0"/>
+              <a:t/>
+            </a:r>
+            <a:br>
+              <a:rPr lang="fr-FR" sz="2000" dirty="0" smtClean="0"/>
+            </a:br>
+            <a:r>
+              <a:rPr lang="fr-FR" sz="2000" dirty="0" smtClean="0"/>
+              <a:t/>
+            </a:r>
+            <a:br>
+              <a:rPr lang="fr-FR" sz="2000" dirty="0" smtClean="0"/>
+            </a:br>
+            <a:r>
+              <a:rPr lang="fr-FR" sz="2000" dirty="0" err="1" smtClean="0"/>
+              <a:t>logger</a:t>
+            </a:r>
+            <a:r>
+              <a:rPr lang="fr-FR" sz="2000" dirty="0"/>
+              <a:t/>
+            </a:r>
+            <a:br>
+              <a:rPr lang="fr-FR" sz="2000" dirty="0"/>
+            </a:br>
+            <a:r>
+              <a:rPr lang="fr-FR" sz="2000" dirty="0"/>
+              <a:t>mailer</a:t>
+            </a:r>
+            <a:br>
+              <a:rPr lang="fr-FR" sz="2000" dirty="0"/>
+            </a:br>
+            <a:r>
+              <a:rPr lang="fr-FR" sz="2000" dirty="0" smtClean="0"/>
+              <a:t>translator</a:t>
+            </a:r>
+            <a:br>
+              <a:rPr lang="fr-FR" sz="2000" dirty="0" smtClean="0"/>
+            </a:br>
+            <a:r>
+              <a:rPr lang="fr-FR" sz="2000" dirty="0" smtClean="0"/>
+              <a:t>…</a:t>
+            </a:r>
+            <a:br>
+              <a:rPr lang="fr-FR" sz="2000" dirty="0" smtClean="0"/>
+            </a:br>
+            <a:endParaRPr lang="fr-FR" sz="2000" dirty="0"/>
+          </a:p>
+        </p:txBody>
+      </p:sp>
     </p:spTree>
     <p:extLst>
       <p:ext uri="{BB962C8B-B14F-4D97-AF65-F5344CB8AC3E}">

</xml_diff>